<commit_message>
Move image directories, Add CoursewareHub/README.md
</commit_message>
<xml_diff>
--- a/CoursewareHub/images/cw.pptx
+++ b/CoursewareHub/images/cw.pptx
@@ -5,11 +5,13 @@
     <p:sldMasterId id="2147483648" r:id="rId1"/>
   </p:sldMasterIdLst>
   <p:sldIdLst>
-    <p:sldId id="260" r:id="rId2"/>
-    <p:sldId id="261" r:id="rId3"/>
-    <p:sldId id="264" r:id="rId4"/>
-    <p:sldId id="265" r:id="rId5"/>
-    <p:sldId id="266" r:id="rId6"/>
+    <p:sldId id="267" r:id="rId2"/>
+    <p:sldId id="260" r:id="rId3"/>
+    <p:sldId id="268" r:id="rId4"/>
+    <p:sldId id="261" r:id="rId5"/>
+    <p:sldId id="264" r:id="rId6"/>
+    <p:sldId id="265" r:id="rId7"/>
+    <p:sldId id="266" r:id="rId8"/>
   </p:sldIdLst>
   <p:sldSz cx="12192000" cy="6858000"/>
   <p:notesSz cx="6858000" cy="9144000"/>
@@ -263,7 +265,7 @@
           <a:p>
             <a:fld id="{B257E2C2-F507-4F05-841F-567437B54827}" type="datetimeFigureOut">
               <a:rPr kumimoji="1" lang="ja-JP" altLang="en-US" smtClean="0"/>
-              <a:t>2019/10/2</a:t>
+              <a:t>2020/5/11</a:t>
             </a:fld>
             <a:endParaRPr kumimoji="1" lang="ja-JP" altLang="en-US"/>
           </a:p>
@@ -493,7 +495,7 @@
           <a:p>
             <a:fld id="{B257E2C2-F507-4F05-841F-567437B54827}" type="datetimeFigureOut">
               <a:rPr kumimoji="1" lang="ja-JP" altLang="en-US" smtClean="0"/>
-              <a:t>2019/10/2</a:t>
+              <a:t>2020/5/11</a:t>
             </a:fld>
             <a:endParaRPr kumimoji="1" lang="ja-JP" altLang="en-US"/>
           </a:p>
@@ -733,7 +735,7 @@
           <a:p>
             <a:fld id="{B257E2C2-F507-4F05-841F-567437B54827}" type="datetimeFigureOut">
               <a:rPr kumimoji="1" lang="ja-JP" altLang="en-US" smtClean="0"/>
-              <a:t>2019/10/2</a:t>
+              <a:t>2020/5/11</a:t>
             </a:fld>
             <a:endParaRPr kumimoji="1" lang="ja-JP" altLang="en-US"/>
           </a:p>
@@ -963,7 +965,7 @@
           <a:p>
             <a:fld id="{B257E2C2-F507-4F05-841F-567437B54827}" type="datetimeFigureOut">
               <a:rPr kumimoji="1" lang="ja-JP" altLang="en-US" smtClean="0"/>
-              <a:t>2019/10/2</a:t>
+              <a:t>2020/5/11</a:t>
             </a:fld>
             <a:endParaRPr kumimoji="1" lang="ja-JP" altLang="en-US"/>
           </a:p>
@@ -1238,7 +1240,7 @@
           <a:p>
             <a:fld id="{B257E2C2-F507-4F05-841F-567437B54827}" type="datetimeFigureOut">
               <a:rPr kumimoji="1" lang="ja-JP" altLang="en-US" smtClean="0"/>
-              <a:t>2019/10/2</a:t>
+              <a:t>2020/5/11</a:t>
             </a:fld>
             <a:endParaRPr kumimoji="1" lang="ja-JP" altLang="en-US"/>
           </a:p>
@@ -1567,7 +1569,7 @@
           <a:p>
             <a:fld id="{B257E2C2-F507-4F05-841F-567437B54827}" type="datetimeFigureOut">
               <a:rPr kumimoji="1" lang="ja-JP" altLang="en-US" smtClean="0"/>
-              <a:t>2019/10/2</a:t>
+              <a:t>2020/5/11</a:t>
             </a:fld>
             <a:endParaRPr kumimoji="1" lang="ja-JP" altLang="en-US"/>
           </a:p>
@@ -2043,7 +2045,7 @@
           <a:p>
             <a:fld id="{B257E2C2-F507-4F05-841F-567437B54827}" type="datetimeFigureOut">
               <a:rPr kumimoji="1" lang="ja-JP" altLang="en-US" smtClean="0"/>
-              <a:t>2019/10/2</a:t>
+              <a:t>2020/5/11</a:t>
             </a:fld>
             <a:endParaRPr kumimoji="1" lang="ja-JP" altLang="en-US"/>
           </a:p>
@@ -2184,7 +2186,7 @@
           <a:p>
             <a:fld id="{B257E2C2-F507-4F05-841F-567437B54827}" type="datetimeFigureOut">
               <a:rPr kumimoji="1" lang="ja-JP" altLang="en-US" smtClean="0"/>
-              <a:t>2019/10/2</a:t>
+              <a:t>2020/5/11</a:t>
             </a:fld>
             <a:endParaRPr kumimoji="1" lang="ja-JP" altLang="en-US"/>
           </a:p>
@@ -2297,7 +2299,7 @@
           <a:p>
             <a:fld id="{B257E2C2-F507-4F05-841F-567437B54827}" type="datetimeFigureOut">
               <a:rPr kumimoji="1" lang="ja-JP" altLang="en-US" smtClean="0"/>
-              <a:t>2019/10/2</a:t>
+              <a:t>2020/5/11</a:t>
             </a:fld>
             <a:endParaRPr kumimoji="1" lang="ja-JP" altLang="en-US"/>
           </a:p>
@@ -2640,7 +2642,7 @@
           <a:p>
             <a:fld id="{B257E2C2-F507-4F05-841F-567437B54827}" type="datetimeFigureOut">
               <a:rPr kumimoji="1" lang="ja-JP" altLang="en-US" smtClean="0"/>
-              <a:t>2019/10/2</a:t>
+              <a:t>2020/5/11</a:t>
             </a:fld>
             <a:endParaRPr kumimoji="1" lang="ja-JP" altLang="en-US"/>
           </a:p>
@@ -2928,7 +2930,7 @@
           <a:p>
             <a:fld id="{B257E2C2-F507-4F05-841F-567437B54827}" type="datetimeFigureOut">
               <a:rPr kumimoji="1" lang="ja-JP" altLang="en-US" smtClean="0"/>
-              <a:t>2019/10/2</a:t>
+              <a:t>2020/5/11</a:t>
             </a:fld>
             <a:endParaRPr kumimoji="1" lang="ja-JP" altLang="en-US"/>
           </a:p>
@@ -3201,7 +3203,7 @@
           <a:p>
             <a:fld id="{B257E2C2-F507-4F05-841F-567437B54827}" type="datetimeFigureOut">
               <a:rPr kumimoji="1" lang="ja-JP" altLang="en-US" smtClean="0"/>
-              <a:t>2019/10/2</a:t>
+              <a:t>2020/5/11</a:t>
             </a:fld>
             <a:endParaRPr kumimoji="1" lang="ja-JP" altLang="en-US"/>
           </a:p>
@@ -3602,6 +3604,3121 @@
 </file>
 
 <file path=ppt/slides/slide1.xml><?xml version="1.0" encoding="utf-8"?>
+<p:sld xmlns:a="http://schemas.openxmlformats.org/drawingml/2006/main" xmlns:r="http://schemas.openxmlformats.org/officeDocument/2006/relationships" xmlns:p="http://schemas.openxmlformats.org/presentationml/2006/main">
+  <p:cSld>
+    <p:spTree>
+      <p:nvGrpSpPr>
+        <p:cNvPr id="1" name=""/>
+        <p:cNvGrpSpPr/>
+        <p:nvPr/>
+      </p:nvGrpSpPr>
+      <p:grpSpPr>
+        <a:xfrm>
+          <a:off x="0" y="0"/>
+          <a:ext cx="0" cy="0"/>
+          <a:chOff x="0" y="0"/>
+          <a:chExt cx="0" cy="0"/>
+        </a:xfrm>
+      </p:grpSpPr>
+      <p:grpSp>
+        <p:nvGrpSpPr>
+          <p:cNvPr id="63" name="グループ化 62">
+            <a:extLst>
+              <a:ext uri="{FF2B5EF4-FFF2-40B4-BE49-F238E27FC236}">
+                <a16:creationId xmlns:a16="http://schemas.microsoft.com/office/drawing/2014/main" id="{952F86D9-64BB-4E97-9F21-121141CAAAC7}"/>
+              </a:ext>
+            </a:extLst>
+          </p:cNvPr>
+          <p:cNvGrpSpPr/>
+          <p:nvPr/>
+        </p:nvGrpSpPr>
+        <p:grpSpPr>
+          <a:xfrm>
+            <a:off x="1997336" y="1247789"/>
+            <a:ext cx="8197328" cy="4362422"/>
+            <a:chOff x="1485229" y="1247789"/>
+            <a:chExt cx="8197328" cy="4362422"/>
+          </a:xfrm>
+        </p:grpSpPr>
+        <p:sp>
+          <p:nvSpPr>
+            <p:cNvPr id="82" name="正方形/長方形 81">
+              <a:extLst>
+                <a:ext uri="{FF2B5EF4-FFF2-40B4-BE49-F238E27FC236}">
+                  <a16:creationId xmlns:a16="http://schemas.microsoft.com/office/drawing/2014/main" id="{B66D16B3-16D3-4705-9385-C35E3FEE9545}"/>
+                </a:ext>
+              </a:extLst>
+            </p:cNvPr>
+            <p:cNvSpPr/>
+            <p:nvPr/>
+          </p:nvSpPr>
+          <p:spPr>
+            <a:xfrm>
+              <a:off x="7811772" y="1247789"/>
+              <a:ext cx="1870785" cy="4362421"/>
+            </a:xfrm>
+            <a:prstGeom prst="rect">
+              <a:avLst/>
+            </a:prstGeom>
+            <a:noFill/>
+            <a:ln w="38100">
+              <a:solidFill>
+                <a:schemeClr val="accent3">
+                  <a:lumMod val="60000"/>
+                  <a:lumOff val="40000"/>
+                </a:schemeClr>
+              </a:solidFill>
+              <a:prstDash val="sysDash"/>
+            </a:ln>
+          </p:spPr>
+          <p:style>
+            <a:lnRef idx="0">
+              <a:scrgbClr r="0" g="0" b="0"/>
+            </a:lnRef>
+            <a:fillRef idx="0">
+              <a:scrgbClr r="0" g="0" b="0"/>
+            </a:fillRef>
+            <a:effectRef idx="0">
+              <a:scrgbClr r="0" g="0" b="0"/>
+            </a:effectRef>
+            <a:fontRef idx="minor">
+              <a:schemeClr val="lt1"/>
+            </a:fontRef>
+          </p:style>
+          <p:txBody>
+            <a:bodyPr rtlCol="0" anchor="t"/>
+            <a:lstStyle/>
+            <a:p>
+              <a:pPr algn="ctr"/>
+              <a:r>
+                <a:rPr lang="ja-JP" altLang="en-US" sz="1200" dirty="0">
+                  <a:solidFill>
+                    <a:schemeClr val="tx1"/>
+                  </a:solidFill>
+                </a:rPr>
+                <a:t>ノードサーバ</a:t>
+              </a:r>
+              <a:endParaRPr kumimoji="1" lang="ja-JP" altLang="en-US" sz="1200" dirty="0">
+                <a:solidFill>
+                  <a:schemeClr val="tx1"/>
+                </a:solidFill>
+              </a:endParaRPr>
+            </a:p>
+          </p:txBody>
+        </p:sp>
+        <p:cxnSp>
+          <p:nvCxnSpPr>
+            <p:cNvPr id="105" name="コネクタ: カギ線 104">
+              <a:extLst>
+                <a:ext uri="{FF2B5EF4-FFF2-40B4-BE49-F238E27FC236}">
+                  <a16:creationId xmlns:a16="http://schemas.microsoft.com/office/drawing/2014/main" id="{947C679E-A80F-491E-87D0-1DBFDF755F29}"/>
+                </a:ext>
+              </a:extLst>
+            </p:cNvPr>
+            <p:cNvCxnSpPr>
+              <a:cxnSpLocks/>
+              <a:stCxn id="102" idx="1"/>
+              <a:endCxn id="5" idx="2"/>
+            </p:cNvCxnSpPr>
+            <p:nvPr/>
+          </p:nvCxnSpPr>
+          <p:spPr>
+            <a:xfrm rot="5400000" flipH="1" flipV="1">
+              <a:off x="5578814" y="3605671"/>
+              <a:ext cx="1011516" cy="2"/>
+            </a:xfrm>
+            <a:prstGeom prst="bentConnector3">
+              <a:avLst>
+                <a:gd name="adj1" fmla="val 50000"/>
+              </a:avLst>
+            </a:prstGeom>
+          </p:spPr>
+          <p:style>
+            <a:lnRef idx="1">
+              <a:schemeClr val="accent2"/>
+            </a:lnRef>
+            <a:fillRef idx="0">
+              <a:schemeClr val="accent2"/>
+            </a:fillRef>
+            <a:effectRef idx="0">
+              <a:schemeClr val="accent2"/>
+            </a:effectRef>
+            <a:fontRef idx="minor">
+              <a:schemeClr val="tx1"/>
+            </a:fontRef>
+          </p:style>
+        </p:cxnSp>
+        <p:sp>
+          <p:nvSpPr>
+            <p:cNvPr id="4" name="正方形/長方形 3">
+              <a:extLst>
+                <a:ext uri="{FF2B5EF4-FFF2-40B4-BE49-F238E27FC236}">
+                  <a16:creationId xmlns:a16="http://schemas.microsoft.com/office/drawing/2014/main" id="{C0481EE5-DEAE-4C0F-A127-D8330C64C5A7}"/>
+                </a:ext>
+              </a:extLst>
+            </p:cNvPr>
+            <p:cNvSpPr/>
+            <p:nvPr/>
+          </p:nvSpPr>
+          <p:spPr>
+            <a:xfrm>
+              <a:off x="2884938" y="2217801"/>
+              <a:ext cx="2223750" cy="921929"/>
+            </a:xfrm>
+            <a:prstGeom prst="rect">
+              <a:avLst/>
+            </a:prstGeom>
+          </p:spPr>
+          <p:style>
+            <a:lnRef idx="1">
+              <a:schemeClr val="accent6"/>
+            </a:lnRef>
+            <a:fillRef idx="2">
+              <a:schemeClr val="accent6"/>
+            </a:fillRef>
+            <a:effectRef idx="1">
+              <a:schemeClr val="accent6"/>
+            </a:effectRef>
+            <a:fontRef idx="minor">
+              <a:schemeClr val="dk1"/>
+            </a:fontRef>
+          </p:style>
+          <p:txBody>
+            <a:bodyPr rtlCol="0" anchor="t"/>
+            <a:lstStyle/>
+            <a:p>
+              <a:pPr algn="ctr"/>
+              <a:r>
+                <a:rPr kumimoji="1" lang="ja-JP" altLang="en-US" sz="1400" dirty="0"/>
+                <a:t>リバースプロキシ</a:t>
+              </a:r>
+            </a:p>
+          </p:txBody>
+        </p:sp>
+        <p:sp>
+          <p:nvSpPr>
+            <p:cNvPr id="5" name="正方形/長方形 4">
+              <a:extLst>
+                <a:ext uri="{FF2B5EF4-FFF2-40B4-BE49-F238E27FC236}">
+                  <a16:creationId xmlns:a16="http://schemas.microsoft.com/office/drawing/2014/main" id="{3DD2AFCB-3ED3-4451-88E5-98FE494FB882}"/>
+                </a:ext>
+              </a:extLst>
+            </p:cNvPr>
+            <p:cNvSpPr/>
+            <p:nvPr/>
+          </p:nvSpPr>
+          <p:spPr>
+            <a:xfrm>
+              <a:off x="5508839" y="2422579"/>
+              <a:ext cx="1151467" cy="677335"/>
+            </a:xfrm>
+            <a:prstGeom prst="rect">
+              <a:avLst/>
+            </a:prstGeom>
+          </p:spPr>
+          <p:style>
+            <a:lnRef idx="1">
+              <a:schemeClr val="accent6"/>
+            </a:lnRef>
+            <a:fillRef idx="2">
+              <a:schemeClr val="accent6"/>
+            </a:fillRef>
+            <a:effectRef idx="1">
+              <a:schemeClr val="accent6"/>
+            </a:effectRef>
+            <a:fontRef idx="minor">
+              <a:schemeClr val="dk1"/>
+            </a:fontRef>
+          </p:style>
+          <p:txBody>
+            <a:bodyPr rtlCol="0" anchor="ctr"/>
+            <a:lstStyle/>
+            <a:p>
+              <a:pPr algn="ctr"/>
+              <a:r>
+                <a:rPr kumimoji="1" lang="en-US" altLang="ja-JP" sz="1400" dirty="0" err="1"/>
+                <a:t>JupyterHub</a:t>
+              </a:r>
+              <a:endParaRPr kumimoji="1" lang="ja-JP" altLang="en-US" sz="1400" dirty="0"/>
+            </a:p>
+          </p:txBody>
+        </p:sp>
+        <p:sp>
+          <p:nvSpPr>
+            <p:cNvPr id="6" name="正方形/長方形 5">
+              <a:extLst>
+                <a:ext uri="{FF2B5EF4-FFF2-40B4-BE49-F238E27FC236}">
+                  <a16:creationId xmlns:a16="http://schemas.microsoft.com/office/drawing/2014/main" id="{48DB5198-4C9B-4615-9F80-A2FFCCAB4F46}"/>
+                </a:ext>
+              </a:extLst>
+            </p:cNvPr>
+            <p:cNvSpPr/>
+            <p:nvPr/>
+          </p:nvSpPr>
+          <p:spPr>
+            <a:xfrm>
+              <a:off x="8172330" y="2582104"/>
+              <a:ext cx="1151467" cy="677335"/>
+            </a:xfrm>
+            <a:prstGeom prst="rect">
+              <a:avLst/>
+            </a:prstGeom>
+          </p:spPr>
+          <p:style>
+            <a:lnRef idx="1">
+              <a:schemeClr val="accent6"/>
+            </a:lnRef>
+            <a:fillRef idx="2">
+              <a:schemeClr val="accent6"/>
+            </a:fillRef>
+            <a:effectRef idx="1">
+              <a:schemeClr val="accent6"/>
+            </a:effectRef>
+            <a:fontRef idx="minor">
+              <a:schemeClr val="dk1"/>
+            </a:fontRef>
+          </p:style>
+          <p:txBody>
+            <a:bodyPr rtlCol="0" anchor="ctr"/>
+            <a:lstStyle/>
+            <a:p>
+              <a:pPr algn="ctr"/>
+              <a:r>
+                <a:rPr lang="en-US" altLang="ja-JP" sz="1400" dirty="0" err="1"/>
+                <a:t>Jupyter</a:t>
+              </a:r>
+              <a:endParaRPr lang="en-US" altLang="ja-JP" sz="1400" dirty="0"/>
+            </a:p>
+            <a:p>
+              <a:pPr algn="ctr"/>
+              <a:r>
+                <a:rPr lang="en-US" altLang="ja-JP" sz="1400" dirty="0"/>
+                <a:t>Notebook</a:t>
+              </a:r>
+              <a:endParaRPr lang="ja-JP" altLang="en-US" sz="1400" dirty="0"/>
+            </a:p>
+          </p:txBody>
+        </p:sp>
+        <p:sp>
+          <p:nvSpPr>
+            <p:cNvPr id="7" name="正方形/長方形 6">
+              <a:extLst>
+                <a:ext uri="{FF2B5EF4-FFF2-40B4-BE49-F238E27FC236}">
+                  <a16:creationId xmlns:a16="http://schemas.microsoft.com/office/drawing/2014/main" id="{6F46EBAF-5F8A-4DF9-9378-D57A1ACBDFCA}"/>
+                </a:ext>
+              </a:extLst>
+            </p:cNvPr>
+            <p:cNvSpPr/>
+            <p:nvPr/>
+          </p:nvSpPr>
+          <p:spPr>
+            <a:xfrm>
+              <a:off x="3415979" y="4129865"/>
+              <a:ext cx="1151467" cy="677335"/>
+            </a:xfrm>
+            <a:prstGeom prst="rect">
+              <a:avLst/>
+            </a:prstGeom>
+          </p:spPr>
+          <p:style>
+            <a:lnRef idx="1">
+              <a:schemeClr val="accent6"/>
+            </a:lnRef>
+            <a:fillRef idx="2">
+              <a:schemeClr val="accent6"/>
+            </a:fillRef>
+            <a:effectRef idx="1">
+              <a:schemeClr val="accent6"/>
+            </a:effectRef>
+            <a:fontRef idx="minor">
+              <a:schemeClr val="dk1"/>
+            </a:fontRef>
+          </p:style>
+          <p:txBody>
+            <a:bodyPr rtlCol="0" anchor="ctr"/>
+            <a:lstStyle/>
+            <a:p>
+              <a:pPr algn="ctr"/>
+              <a:r>
+                <a:rPr kumimoji="1" lang="en-US" altLang="ja-JP" sz="1200" dirty="0"/>
+                <a:t>PostgreSQL</a:t>
+              </a:r>
+              <a:endParaRPr kumimoji="1" lang="ja-JP" altLang="en-US" sz="1200" dirty="0"/>
+            </a:p>
+          </p:txBody>
+        </p:sp>
+        <p:sp>
+          <p:nvSpPr>
+            <p:cNvPr id="8" name="正方形/長方形 7">
+              <a:extLst>
+                <a:ext uri="{FF2B5EF4-FFF2-40B4-BE49-F238E27FC236}">
+                  <a16:creationId xmlns:a16="http://schemas.microsoft.com/office/drawing/2014/main" id="{FFFFBC67-ABCA-447D-A81F-E7FA844FF3AC}"/>
+                </a:ext>
+              </a:extLst>
+            </p:cNvPr>
+            <p:cNvSpPr/>
+            <p:nvPr/>
+          </p:nvSpPr>
+          <p:spPr>
+            <a:xfrm>
+              <a:off x="8172330" y="3588511"/>
+              <a:ext cx="1151467" cy="677335"/>
+            </a:xfrm>
+            <a:prstGeom prst="rect">
+              <a:avLst/>
+            </a:prstGeom>
+          </p:spPr>
+          <p:style>
+            <a:lnRef idx="1">
+              <a:schemeClr val="accent6"/>
+            </a:lnRef>
+            <a:fillRef idx="2">
+              <a:schemeClr val="accent6"/>
+            </a:fillRef>
+            <a:effectRef idx="1">
+              <a:schemeClr val="accent6"/>
+            </a:effectRef>
+            <a:fontRef idx="minor">
+              <a:schemeClr val="dk1"/>
+            </a:fontRef>
+          </p:style>
+          <p:txBody>
+            <a:bodyPr rtlCol="0" anchor="ctr"/>
+            <a:lstStyle/>
+            <a:p>
+              <a:pPr algn="ctr"/>
+              <a:r>
+                <a:rPr lang="en-US" altLang="ja-JP" sz="1400" dirty="0" err="1"/>
+                <a:t>Jupyter</a:t>
+              </a:r>
+              <a:endParaRPr lang="en-US" altLang="ja-JP" sz="1400" dirty="0"/>
+            </a:p>
+            <a:p>
+              <a:pPr algn="ctr"/>
+              <a:r>
+                <a:rPr lang="en-US" altLang="ja-JP" sz="1400" dirty="0"/>
+                <a:t>Notebook</a:t>
+              </a:r>
+              <a:endParaRPr lang="ja-JP" altLang="en-US" sz="1400" dirty="0"/>
+            </a:p>
+          </p:txBody>
+        </p:sp>
+        <p:sp>
+          <p:nvSpPr>
+            <p:cNvPr id="9" name="正方形/長方形 8">
+              <a:extLst>
+                <a:ext uri="{FF2B5EF4-FFF2-40B4-BE49-F238E27FC236}">
+                  <a16:creationId xmlns:a16="http://schemas.microsoft.com/office/drawing/2014/main" id="{23A56B75-8629-43EB-B460-E0AD4F6FC2D2}"/>
+                </a:ext>
+              </a:extLst>
+            </p:cNvPr>
+            <p:cNvSpPr/>
+            <p:nvPr/>
+          </p:nvSpPr>
+          <p:spPr>
+            <a:xfrm>
+              <a:off x="8171430" y="1578113"/>
+              <a:ext cx="1151467" cy="677335"/>
+            </a:xfrm>
+            <a:prstGeom prst="rect">
+              <a:avLst/>
+            </a:prstGeom>
+          </p:spPr>
+          <p:style>
+            <a:lnRef idx="1">
+              <a:schemeClr val="accent6"/>
+            </a:lnRef>
+            <a:fillRef idx="2">
+              <a:schemeClr val="accent6"/>
+            </a:fillRef>
+            <a:effectRef idx="1">
+              <a:schemeClr val="accent6"/>
+            </a:effectRef>
+            <a:fontRef idx="minor">
+              <a:schemeClr val="dk1"/>
+            </a:fontRef>
+          </p:style>
+          <p:txBody>
+            <a:bodyPr rtlCol="0" anchor="ctr"/>
+            <a:lstStyle/>
+            <a:p>
+              <a:pPr algn="ctr"/>
+              <a:r>
+                <a:rPr kumimoji="1" lang="en-US" altLang="ja-JP" sz="1400" dirty="0" err="1"/>
+                <a:t>Jupyter</a:t>
+              </a:r>
+              <a:endParaRPr kumimoji="1" lang="en-US" altLang="ja-JP" sz="1400" dirty="0"/>
+            </a:p>
+            <a:p>
+              <a:pPr algn="ctr"/>
+              <a:r>
+                <a:rPr kumimoji="1" lang="en-US" altLang="ja-JP" sz="1400" dirty="0"/>
+                <a:t>Notebook</a:t>
+              </a:r>
+              <a:endParaRPr kumimoji="1" lang="ja-JP" altLang="en-US" sz="1400" dirty="0"/>
+            </a:p>
+          </p:txBody>
+        </p:sp>
+        <p:cxnSp>
+          <p:nvCxnSpPr>
+            <p:cNvPr id="11" name="直線コネクタ 10">
+              <a:extLst>
+                <a:ext uri="{FF2B5EF4-FFF2-40B4-BE49-F238E27FC236}">
+                  <a16:creationId xmlns:a16="http://schemas.microsoft.com/office/drawing/2014/main" id="{476A32AB-92C2-4016-8A5F-839254107564}"/>
+                </a:ext>
+              </a:extLst>
+            </p:cNvPr>
+            <p:cNvCxnSpPr>
+              <a:cxnSpLocks/>
+              <a:stCxn id="4" idx="2"/>
+              <a:endCxn id="7" idx="0"/>
+            </p:cNvCxnSpPr>
+            <p:nvPr/>
+          </p:nvCxnSpPr>
+          <p:spPr>
+            <a:xfrm flipH="1">
+              <a:off x="3991713" y="3139730"/>
+              <a:ext cx="5100" cy="990135"/>
+            </a:xfrm>
+            <a:prstGeom prst="line">
+              <a:avLst/>
+            </a:prstGeom>
+          </p:spPr>
+          <p:style>
+            <a:lnRef idx="1">
+              <a:schemeClr val="accent1"/>
+            </a:lnRef>
+            <a:fillRef idx="0">
+              <a:schemeClr val="accent1"/>
+            </a:fillRef>
+            <a:effectRef idx="0">
+              <a:schemeClr val="accent1"/>
+            </a:effectRef>
+            <a:fontRef idx="minor">
+              <a:schemeClr val="tx1"/>
+            </a:fontRef>
+          </p:style>
+        </p:cxnSp>
+        <p:cxnSp>
+          <p:nvCxnSpPr>
+            <p:cNvPr id="13" name="直線コネクタ 12">
+              <a:extLst>
+                <a:ext uri="{FF2B5EF4-FFF2-40B4-BE49-F238E27FC236}">
+                  <a16:creationId xmlns:a16="http://schemas.microsoft.com/office/drawing/2014/main" id="{DECA7EEE-75B6-42BA-8C79-D2749F8D41BC}"/>
+                </a:ext>
+              </a:extLst>
+            </p:cNvPr>
+            <p:cNvCxnSpPr>
+              <a:cxnSpLocks/>
+              <a:stCxn id="16" idx="3"/>
+              <a:endCxn id="5" idx="1"/>
+            </p:cNvCxnSpPr>
+            <p:nvPr/>
+          </p:nvCxnSpPr>
+          <p:spPr>
+            <a:xfrm>
+              <a:off x="4630989" y="2758797"/>
+              <a:ext cx="877850" cy="2450"/>
+            </a:xfrm>
+            <a:prstGeom prst="line">
+              <a:avLst/>
+            </a:prstGeom>
+          </p:spPr>
+          <p:style>
+            <a:lnRef idx="1">
+              <a:schemeClr val="accent1"/>
+            </a:lnRef>
+            <a:fillRef idx="0">
+              <a:schemeClr val="accent1"/>
+            </a:fillRef>
+            <a:effectRef idx="0">
+              <a:schemeClr val="accent1"/>
+            </a:effectRef>
+            <a:fontRef idx="minor">
+              <a:schemeClr val="tx1"/>
+            </a:fontRef>
+          </p:style>
+        </p:cxnSp>
+        <p:pic>
+          <p:nvPicPr>
+            <p:cNvPr id="65" name="Picture 40">
+              <a:extLst>
+                <a:ext uri="{FF2B5EF4-FFF2-40B4-BE49-F238E27FC236}">
+                  <a16:creationId xmlns:a16="http://schemas.microsoft.com/office/drawing/2014/main" id="{1D384AC5-ACAC-4E6C-881E-D3C0A7C63A45}"/>
+                </a:ext>
+              </a:extLst>
+            </p:cNvPr>
+            <p:cNvPicPr>
+              <a:picLocks noChangeAspect="1"/>
+            </p:cNvPicPr>
+            <p:nvPr/>
+          </p:nvPicPr>
+          <p:blipFill>
+            <a:blip r:embed="rId2">
+              <a:extLst>
+                <a:ext uri="{28A0092B-C50C-407E-A947-70E740481C1C}">
+                  <a14:useLocalDpi xmlns:a14="http://schemas.microsoft.com/office/drawing/2010/main" val="0"/>
+                </a:ext>
+              </a:extLst>
+            </a:blip>
+            <a:stretch>
+              <a:fillRect/>
+            </a:stretch>
+          </p:blipFill>
+          <p:spPr>
+            <a:xfrm>
+              <a:off x="1837007" y="2483712"/>
+              <a:ext cx="412625" cy="550167"/>
+            </a:xfrm>
+            <a:prstGeom prst="rect">
+              <a:avLst/>
+            </a:prstGeom>
+          </p:spPr>
+        </p:pic>
+        <p:cxnSp>
+          <p:nvCxnSpPr>
+            <p:cNvPr id="66" name="直線矢印コネクタ 65">
+              <a:extLst>
+                <a:ext uri="{FF2B5EF4-FFF2-40B4-BE49-F238E27FC236}">
+                  <a16:creationId xmlns:a16="http://schemas.microsoft.com/office/drawing/2014/main" id="{3C0F7846-0BE7-4593-9A04-4C19E9A02E9C}"/>
+                </a:ext>
+              </a:extLst>
+            </p:cNvPr>
+            <p:cNvCxnSpPr>
+              <a:cxnSpLocks/>
+              <a:stCxn id="65" idx="3"/>
+              <a:endCxn id="16" idx="1"/>
+            </p:cNvCxnSpPr>
+            <p:nvPr/>
+          </p:nvCxnSpPr>
+          <p:spPr>
+            <a:xfrm>
+              <a:off x="2249632" y="2758796"/>
+              <a:ext cx="1049667" cy="1"/>
+            </a:xfrm>
+            <a:prstGeom prst="straightConnector1">
+              <a:avLst/>
+            </a:prstGeom>
+            <a:ln w="28575">
+              <a:solidFill>
+                <a:schemeClr val="accent5"/>
+              </a:solidFill>
+              <a:prstDash val="sysDash"/>
+              <a:headEnd type="none" w="med" len="med"/>
+              <a:tailEnd type="arrow" w="med" len="med"/>
+            </a:ln>
+          </p:spPr>
+          <p:style>
+            <a:lnRef idx="3">
+              <a:schemeClr val="accent2"/>
+            </a:lnRef>
+            <a:fillRef idx="0">
+              <a:schemeClr val="accent2"/>
+            </a:fillRef>
+            <a:effectRef idx="2">
+              <a:schemeClr val="accent2"/>
+            </a:effectRef>
+            <a:fontRef idx="minor">
+              <a:schemeClr val="tx1"/>
+            </a:fontRef>
+          </p:style>
+        </p:cxnSp>
+        <p:cxnSp>
+          <p:nvCxnSpPr>
+            <p:cNvPr id="72" name="コネクタ: カギ線 71">
+              <a:extLst>
+                <a:ext uri="{FF2B5EF4-FFF2-40B4-BE49-F238E27FC236}">
+                  <a16:creationId xmlns:a16="http://schemas.microsoft.com/office/drawing/2014/main" id="{07AEB22C-0410-4F56-9863-2E2B25A62D8E}"/>
+                </a:ext>
+              </a:extLst>
+            </p:cNvPr>
+            <p:cNvCxnSpPr>
+              <a:cxnSpLocks/>
+              <a:stCxn id="5" idx="3"/>
+              <a:endCxn id="6" idx="1"/>
+            </p:cNvCxnSpPr>
+            <p:nvPr/>
+          </p:nvCxnSpPr>
+          <p:spPr>
+            <a:xfrm>
+              <a:off x="6660306" y="2761247"/>
+              <a:ext cx="1512024" cy="159525"/>
+            </a:xfrm>
+            <a:prstGeom prst="bentConnector3">
+              <a:avLst>
+                <a:gd name="adj1" fmla="val 50000"/>
+              </a:avLst>
+            </a:prstGeom>
+          </p:spPr>
+          <p:style>
+            <a:lnRef idx="1">
+              <a:schemeClr val="accent1"/>
+            </a:lnRef>
+            <a:fillRef idx="0">
+              <a:schemeClr val="accent1"/>
+            </a:fillRef>
+            <a:effectRef idx="0">
+              <a:schemeClr val="accent1"/>
+            </a:effectRef>
+            <a:fontRef idx="minor">
+              <a:schemeClr val="tx1"/>
+            </a:fontRef>
+          </p:style>
+        </p:cxnSp>
+        <p:cxnSp>
+          <p:nvCxnSpPr>
+            <p:cNvPr id="75" name="コネクタ: カギ線 74">
+              <a:extLst>
+                <a:ext uri="{FF2B5EF4-FFF2-40B4-BE49-F238E27FC236}">
+                  <a16:creationId xmlns:a16="http://schemas.microsoft.com/office/drawing/2014/main" id="{5C557D84-D7F3-4E7A-A87F-3DAFEA841052}"/>
+                </a:ext>
+              </a:extLst>
+            </p:cNvPr>
+            <p:cNvCxnSpPr>
+              <a:cxnSpLocks/>
+              <a:stCxn id="5" idx="3"/>
+              <a:endCxn id="8" idx="1"/>
+            </p:cNvCxnSpPr>
+            <p:nvPr/>
+          </p:nvCxnSpPr>
+          <p:spPr>
+            <a:xfrm>
+              <a:off x="6660306" y="2761247"/>
+              <a:ext cx="1512024" cy="1165932"/>
+            </a:xfrm>
+            <a:prstGeom prst="bentConnector3">
+              <a:avLst>
+                <a:gd name="adj1" fmla="val 50000"/>
+              </a:avLst>
+            </a:prstGeom>
+          </p:spPr>
+          <p:style>
+            <a:lnRef idx="1">
+              <a:schemeClr val="accent1"/>
+            </a:lnRef>
+            <a:fillRef idx="0">
+              <a:schemeClr val="accent1"/>
+            </a:fillRef>
+            <a:effectRef idx="0">
+              <a:schemeClr val="accent1"/>
+            </a:effectRef>
+            <a:fontRef idx="minor">
+              <a:schemeClr val="tx1"/>
+            </a:fontRef>
+          </p:style>
+        </p:cxnSp>
+        <p:cxnSp>
+          <p:nvCxnSpPr>
+            <p:cNvPr id="3" name="コネクタ: カギ線 2">
+              <a:extLst>
+                <a:ext uri="{FF2B5EF4-FFF2-40B4-BE49-F238E27FC236}">
+                  <a16:creationId xmlns:a16="http://schemas.microsoft.com/office/drawing/2014/main" id="{B26A86F9-20B6-4B90-8E86-6350B93C1234}"/>
+                </a:ext>
+              </a:extLst>
+            </p:cNvPr>
+            <p:cNvCxnSpPr>
+              <a:cxnSpLocks/>
+              <a:stCxn id="5" idx="2"/>
+              <a:endCxn id="7" idx="0"/>
+            </p:cNvCxnSpPr>
+            <p:nvPr/>
+          </p:nvCxnSpPr>
+          <p:spPr>
+            <a:xfrm rot="5400000">
+              <a:off x="4523168" y="2568459"/>
+              <a:ext cx="1029951" cy="2092860"/>
+            </a:xfrm>
+            <a:prstGeom prst="bentConnector3">
+              <a:avLst>
+                <a:gd name="adj1" fmla="val 50000"/>
+              </a:avLst>
+            </a:prstGeom>
+          </p:spPr>
+          <p:style>
+            <a:lnRef idx="1">
+              <a:schemeClr val="accent1"/>
+            </a:lnRef>
+            <a:fillRef idx="0">
+              <a:schemeClr val="accent1"/>
+            </a:fillRef>
+            <a:effectRef idx="0">
+              <a:schemeClr val="accent1"/>
+            </a:effectRef>
+            <a:fontRef idx="minor">
+              <a:schemeClr val="tx1"/>
+            </a:fontRef>
+          </p:style>
+        </p:cxnSp>
+        <p:sp>
+          <p:nvSpPr>
+            <p:cNvPr id="16" name="四角形: 角を丸くする 15">
+              <a:extLst>
+                <a:ext uri="{FF2B5EF4-FFF2-40B4-BE49-F238E27FC236}">
+                  <a16:creationId xmlns:a16="http://schemas.microsoft.com/office/drawing/2014/main" id="{675627B6-91FF-41AA-A578-B5B17A6A55C2}"/>
+                </a:ext>
+              </a:extLst>
+            </p:cNvPr>
+            <p:cNvSpPr/>
+            <p:nvPr/>
+          </p:nvSpPr>
+          <p:spPr>
+            <a:xfrm>
+              <a:off x="3299299" y="2550796"/>
+              <a:ext cx="1331690" cy="416001"/>
+            </a:xfrm>
+            <a:prstGeom prst="roundRect">
+              <a:avLst/>
+            </a:prstGeom>
+          </p:spPr>
+          <p:style>
+            <a:lnRef idx="1">
+              <a:schemeClr val="accent4"/>
+            </a:lnRef>
+            <a:fillRef idx="2">
+              <a:schemeClr val="accent4"/>
+            </a:fillRef>
+            <a:effectRef idx="1">
+              <a:schemeClr val="accent4"/>
+            </a:effectRef>
+            <a:fontRef idx="minor">
+              <a:schemeClr val="dk1"/>
+            </a:fontRef>
+          </p:style>
+          <p:txBody>
+            <a:bodyPr rtlCol="0" anchor="ctr"/>
+            <a:lstStyle/>
+            <a:p>
+              <a:pPr algn="ctr"/>
+              <a:r>
+                <a:rPr lang="en-US" altLang="ja-JP" sz="1400" dirty="0"/>
+                <a:t>N</a:t>
+              </a:r>
+              <a:r>
+                <a:rPr kumimoji="1" lang="en-US" altLang="ja-JP" sz="1400" dirty="0"/>
+                <a:t>ginx</a:t>
+              </a:r>
+              <a:endParaRPr kumimoji="1" lang="ja-JP" altLang="en-US" sz="1400" dirty="0"/>
+            </a:p>
+          </p:txBody>
+        </p:sp>
+        <p:sp>
+          <p:nvSpPr>
+            <p:cNvPr id="41" name="四角形: 角を丸くする 40">
+              <a:extLst>
+                <a:ext uri="{FF2B5EF4-FFF2-40B4-BE49-F238E27FC236}">
+                  <a16:creationId xmlns:a16="http://schemas.microsoft.com/office/drawing/2014/main" id="{78D86529-D896-4A79-AA8F-8370E0BE5F03}"/>
+                </a:ext>
+              </a:extLst>
+            </p:cNvPr>
+            <p:cNvSpPr/>
+            <p:nvPr/>
+          </p:nvSpPr>
+          <p:spPr>
+            <a:xfrm>
+              <a:off x="5508838" y="1631310"/>
+              <a:ext cx="1151467" cy="416001"/>
+            </a:xfrm>
+            <a:prstGeom prst="roundRect">
+              <a:avLst/>
+            </a:prstGeom>
+          </p:spPr>
+          <p:style>
+            <a:lnRef idx="1">
+              <a:schemeClr val="accent4"/>
+            </a:lnRef>
+            <a:fillRef idx="2">
+              <a:schemeClr val="accent4"/>
+            </a:fillRef>
+            <a:effectRef idx="1">
+              <a:schemeClr val="accent4"/>
+            </a:effectRef>
+            <a:fontRef idx="minor">
+              <a:schemeClr val="dk1"/>
+            </a:fontRef>
+          </p:style>
+          <p:txBody>
+            <a:bodyPr rtlCol="0" anchor="ctr"/>
+            <a:lstStyle/>
+            <a:p>
+              <a:pPr algn="ctr"/>
+              <a:r>
+                <a:rPr kumimoji="1" lang="en-US" altLang="ja-JP" sz="1400" dirty="0" err="1"/>
+                <a:t>restuser</a:t>
+              </a:r>
+              <a:endParaRPr kumimoji="1" lang="ja-JP" altLang="en-US" sz="1400" dirty="0"/>
+            </a:p>
+          </p:txBody>
+        </p:sp>
+        <p:cxnSp>
+          <p:nvCxnSpPr>
+            <p:cNvPr id="47" name="直線コネクタ 46">
+              <a:extLst>
+                <a:ext uri="{FF2B5EF4-FFF2-40B4-BE49-F238E27FC236}">
+                  <a16:creationId xmlns:a16="http://schemas.microsoft.com/office/drawing/2014/main" id="{152554D8-E9C5-4A20-8447-BB91C8155C50}"/>
+                </a:ext>
+              </a:extLst>
+            </p:cNvPr>
+            <p:cNvCxnSpPr>
+              <a:cxnSpLocks/>
+              <a:stCxn id="41" idx="2"/>
+              <a:endCxn id="5" idx="0"/>
+            </p:cNvCxnSpPr>
+            <p:nvPr/>
+          </p:nvCxnSpPr>
+          <p:spPr>
+            <a:xfrm>
+              <a:off x="6084572" y="2047311"/>
+              <a:ext cx="1" cy="375268"/>
+            </a:xfrm>
+            <a:prstGeom prst="line">
+              <a:avLst/>
+            </a:prstGeom>
+          </p:spPr>
+          <p:style>
+            <a:lnRef idx="1">
+              <a:schemeClr val="accent1"/>
+            </a:lnRef>
+            <a:fillRef idx="0">
+              <a:schemeClr val="accent1"/>
+            </a:fillRef>
+            <a:effectRef idx="0">
+              <a:schemeClr val="accent1"/>
+            </a:effectRef>
+            <a:fontRef idx="minor">
+              <a:schemeClr val="tx1"/>
+            </a:fontRef>
+          </p:style>
+        </p:cxnSp>
+        <p:sp>
+          <p:nvSpPr>
+            <p:cNvPr id="98" name="テキスト ボックス 97">
+              <a:extLst>
+                <a:ext uri="{FF2B5EF4-FFF2-40B4-BE49-F238E27FC236}">
+                  <a16:creationId xmlns:a16="http://schemas.microsoft.com/office/drawing/2014/main" id="{6EE5A435-0FDE-4B7F-8555-ACBB62FB678B}"/>
+                </a:ext>
+              </a:extLst>
+            </p:cNvPr>
+            <p:cNvSpPr txBox="1"/>
+            <p:nvPr/>
+          </p:nvSpPr>
+          <p:spPr>
+            <a:xfrm>
+              <a:off x="3024746" y="3685848"/>
+              <a:ext cx="1061352" cy="369332"/>
+            </a:xfrm>
+            <a:prstGeom prst="rect">
+              <a:avLst/>
+            </a:prstGeom>
+            <a:noFill/>
+          </p:spPr>
+          <p:txBody>
+            <a:bodyPr wrap="square" rtlCol="0">
+              <a:spAutoFit/>
+            </a:bodyPr>
+            <a:lstStyle/>
+            <a:p>
+              <a:r>
+                <a:rPr kumimoji="1" lang="ja-JP" altLang="en-US" sz="900" dirty="0"/>
+                <a:t>ローカルユーザの認証情報</a:t>
+              </a:r>
+            </a:p>
+          </p:txBody>
+        </p:sp>
+        <p:sp>
+          <p:nvSpPr>
+            <p:cNvPr id="101" name="テキスト ボックス 100">
+              <a:extLst>
+                <a:ext uri="{FF2B5EF4-FFF2-40B4-BE49-F238E27FC236}">
+                  <a16:creationId xmlns:a16="http://schemas.microsoft.com/office/drawing/2014/main" id="{B55CF9A6-9FFC-4553-A6D8-B4FCC061638F}"/>
+                </a:ext>
+              </a:extLst>
+            </p:cNvPr>
+            <p:cNvSpPr txBox="1"/>
+            <p:nvPr/>
+          </p:nvSpPr>
+          <p:spPr>
+            <a:xfrm>
+              <a:off x="4086098" y="3265465"/>
+              <a:ext cx="1009889" cy="369332"/>
+            </a:xfrm>
+            <a:prstGeom prst="rect">
+              <a:avLst/>
+            </a:prstGeom>
+            <a:noFill/>
+          </p:spPr>
+          <p:txBody>
+            <a:bodyPr wrap="square" rtlCol="0">
+              <a:spAutoFit/>
+            </a:bodyPr>
+            <a:lstStyle/>
+            <a:p>
+              <a:r>
+                <a:rPr kumimoji="1" lang="en-US" altLang="ja-JP" sz="900" dirty="0" err="1"/>
+                <a:t>JupyterHub</a:t>
+              </a:r>
+              <a:r>
+                <a:rPr kumimoji="1" lang="ja-JP" altLang="en-US" sz="900" dirty="0"/>
+                <a:t>のユーザ情報など</a:t>
+              </a:r>
+            </a:p>
+          </p:txBody>
+        </p:sp>
+        <p:cxnSp>
+          <p:nvCxnSpPr>
+            <p:cNvPr id="100" name="コネクタ: カギ線 99">
+              <a:extLst>
+                <a:ext uri="{FF2B5EF4-FFF2-40B4-BE49-F238E27FC236}">
+                  <a16:creationId xmlns:a16="http://schemas.microsoft.com/office/drawing/2014/main" id="{5952DB5C-8501-42DA-A9DD-DAC6F2CE19A3}"/>
+                </a:ext>
+              </a:extLst>
+            </p:cNvPr>
+            <p:cNvCxnSpPr>
+              <a:cxnSpLocks/>
+              <a:stCxn id="102" idx="3"/>
+              <a:endCxn id="7" idx="2"/>
+            </p:cNvCxnSpPr>
+            <p:nvPr/>
+          </p:nvCxnSpPr>
+          <p:spPr>
+            <a:xfrm rot="5400000" flipH="1">
+              <a:off x="4832725" y="3966188"/>
+              <a:ext cx="410833" cy="2092858"/>
+            </a:xfrm>
+            <a:prstGeom prst="bentConnector3">
+              <a:avLst>
+                <a:gd name="adj1" fmla="val -55643"/>
+              </a:avLst>
+            </a:prstGeom>
+          </p:spPr>
+          <p:style>
+            <a:lnRef idx="1">
+              <a:schemeClr val="accent2"/>
+            </a:lnRef>
+            <a:fillRef idx="0">
+              <a:schemeClr val="accent2"/>
+            </a:fillRef>
+            <a:effectRef idx="0">
+              <a:schemeClr val="accent2"/>
+            </a:effectRef>
+            <a:fontRef idx="minor">
+              <a:schemeClr val="tx1"/>
+            </a:fontRef>
+          </p:style>
+        </p:cxnSp>
+        <p:cxnSp>
+          <p:nvCxnSpPr>
+            <p:cNvPr id="112" name="コネクタ: カギ線 111">
+              <a:extLst>
+                <a:ext uri="{FF2B5EF4-FFF2-40B4-BE49-F238E27FC236}">
+                  <a16:creationId xmlns:a16="http://schemas.microsoft.com/office/drawing/2014/main" id="{33D94D53-FB2B-4D26-A488-9B3467CDCAF8}"/>
+                </a:ext>
+              </a:extLst>
+            </p:cNvPr>
+            <p:cNvCxnSpPr>
+              <a:cxnSpLocks/>
+              <a:stCxn id="102" idx="4"/>
+              <a:endCxn id="8" idx="3"/>
+            </p:cNvCxnSpPr>
+            <p:nvPr/>
+          </p:nvCxnSpPr>
+          <p:spPr>
+            <a:xfrm flipV="1">
+              <a:off x="7391617" y="3927179"/>
+              <a:ext cx="1932180" cy="737553"/>
+            </a:xfrm>
+            <a:prstGeom prst="bentConnector3">
+              <a:avLst>
+                <a:gd name="adj1" fmla="val 111831"/>
+              </a:avLst>
+            </a:prstGeom>
+          </p:spPr>
+          <p:style>
+            <a:lnRef idx="1">
+              <a:schemeClr val="accent2"/>
+            </a:lnRef>
+            <a:fillRef idx="0">
+              <a:schemeClr val="accent2"/>
+            </a:fillRef>
+            <a:effectRef idx="0">
+              <a:schemeClr val="accent2"/>
+            </a:effectRef>
+            <a:fontRef idx="minor">
+              <a:schemeClr val="tx1"/>
+            </a:fontRef>
+          </p:style>
+        </p:cxnSp>
+        <p:cxnSp>
+          <p:nvCxnSpPr>
+            <p:cNvPr id="115" name="コネクタ: カギ線 114">
+              <a:extLst>
+                <a:ext uri="{FF2B5EF4-FFF2-40B4-BE49-F238E27FC236}">
+                  <a16:creationId xmlns:a16="http://schemas.microsoft.com/office/drawing/2014/main" id="{7174FE47-8503-4BB2-98E0-3F2989A21C01}"/>
+                </a:ext>
+              </a:extLst>
+            </p:cNvPr>
+            <p:cNvCxnSpPr>
+              <a:cxnSpLocks/>
+              <a:stCxn id="102" idx="4"/>
+              <a:endCxn id="6" idx="3"/>
+            </p:cNvCxnSpPr>
+            <p:nvPr/>
+          </p:nvCxnSpPr>
+          <p:spPr>
+            <a:xfrm flipV="1">
+              <a:off x="7391617" y="2920772"/>
+              <a:ext cx="1932180" cy="1743960"/>
+            </a:xfrm>
+            <a:prstGeom prst="bentConnector3">
+              <a:avLst>
+                <a:gd name="adj1" fmla="val 111831"/>
+              </a:avLst>
+            </a:prstGeom>
+          </p:spPr>
+          <p:style>
+            <a:lnRef idx="1">
+              <a:schemeClr val="accent2"/>
+            </a:lnRef>
+            <a:fillRef idx="0">
+              <a:schemeClr val="accent2"/>
+            </a:fillRef>
+            <a:effectRef idx="0">
+              <a:schemeClr val="accent2"/>
+            </a:effectRef>
+            <a:fontRef idx="minor">
+              <a:schemeClr val="tx1"/>
+            </a:fontRef>
+          </p:style>
+        </p:cxnSp>
+        <p:cxnSp>
+          <p:nvCxnSpPr>
+            <p:cNvPr id="118" name="コネクタ: カギ線 117">
+              <a:extLst>
+                <a:ext uri="{FF2B5EF4-FFF2-40B4-BE49-F238E27FC236}">
+                  <a16:creationId xmlns:a16="http://schemas.microsoft.com/office/drawing/2014/main" id="{CA35EE35-4A06-449B-8454-1E4FD8F6A0B2}"/>
+                </a:ext>
+              </a:extLst>
+            </p:cNvPr>
+            <p:cNvCxnSpPr>
+              <a:cxnSpLocks/>
+              <a:stCxn id="102" idx="4"/>
+              <a:endCxn id="9" idx="3"/>
+            </p:cNvCxnSpPr>
+            <p:nvPr/>
+          </p:nvCxnSpPr>
+          <p:spPr>
+            <a:xfrm flipV="1">
+              <a:off x="7391617" y="1916781"/>
+              <a:ext cx="1931280" cy="2747951"/>
+            </a:xfrm>
+            <a:prstGeom prst="bentConnector3">
+              <a:avLst>
+                <a:gd name="adj1" fmla="val 111837"/>
+              </a:avLst>
+            </a:prstGeom>
+          </p:spPr>
+          <p:style>
+            <a:lnRef idx="1">
+              <a:schemeClr val="accent2"/>
+            </a:lnRef>
+            <a:fillRef idx="0">
+              <a:schemeClr val="accent2"/>
+            </a:fillRef>
+            <a:effectRef idx="0">
+              <a:schemeClr val="accent2"/>
+            </a:effectRef>
+            <a:fontRef idx="minor">
+              <a:schemeClr val="tx1"/>
+            </a:fontRef>
+          </p:style>
+        </p:cxnSp>
+        <p:sp>
+          <p:nvSpPr>
+            <p:cNvPr id="125" name="テキスト ボックス 124">
+              <a:extLst>
+                <a:ext uri="{FF2B5EF4-FFF2-40B4-BE49-F238E27FC236}">
+                  <a16:creationId xmlns:a16="http://schemas.microsoft.com/office/drawing/2014/main" id="{477A1B1F-9BE9-4603-9E64-8750D1E6D22F}"/>
+                </a:ext>
+              </a:extLst>
+            </p:cNvPr>
+            <p:cNvSpPr txBox="1"/>
+            <p:nvPr/>
+          </p:nvSpPr>
+          <p:spPr>
+            <a:xfrm>
+              <a:off x="2270828" y="2524634"/>
+              <a:ext cx="464024" cy="230832"/>
+            </a:xfrm>
+            <a:prstGeom prst="rect">
+              <a:avLst/>
+            </a:prstGeom>
+            <a:noFill/>
+          </p:spPr>
+          <p:txBody>
+            <a:bodyPr wrap="square" rtlCol="0">
+              <a:spAutoFit/>
+            </a:bodyPr>
+            <a:lstStyle/>
+            <a:p>
+              <a:r>
+                <a:rPr kumimoji="1" lang="en-US" altLang="ja-JP" sz="900" dirty="0"/>
+                <a:t>https</a:t>
+              </a:r>
+              <a:endParaRPr kumimoji="1" lang="ja-JP" altLang="en-US" sz="900" dirty="0"/>
+            </a:p>
+          </p:txBody>
+        </p:sp>
+        <p:grpSp>
+          <p:nvGrpSpPr>
+            <p:cNvPr id="33" name="グループ化 32">
+              <a:extLst>
+                <a:ext uri="{FF2B5EF4-FFF2-40B4-BE49-F238E27FC236}">
+                  <a16:creationId xmlns:a16="http://schemas.microsoft.com/office/drawing/2014/main" id="{AF793B94-6400-4707-87C2-9B4D475D21E6}"/>
+                </a:ext>
+              </a:extLst>
+            </p:cNvPr>
+            <p:cNvGrpSpPr/>
+            <p:nvPr/>
+          </p:nvGrpSpPr>
+          <p:grpSpPr>
+            <a:xfrm>
+              <a:off x="4777524" y="4111430"/>
+              <a:ext cx="2614093" cy="1106603"/>
+              <a:chOff x="5680058" y="4473191"/>
+              <a:chExt cx="2614093" cy="1106603"/>
+            </a:xfrm>
+          </p:grpSpPr>
+          <p:sp>
+            <p:nvSpPr>
+              <p:cNvPr id="102" name="フローチャート: 磁気ディスク 101">
+                <a:extLst>
+                  <a:ext uri="{FF2B5EF4-FFF2-40B4-BE49-F238E27FC236}">
+                    <a16:creationId xmlns:a16="http://schemas.microsoft.com/office/drawing/2014/main" id="{BC000CE4-D3E6-4879-9486-784EA4E03E38}"/>
+                  </a:ext>
+                </a:extLst>
+              </p:cNvPr>
+              <p:cNvSpPr/>
+              <p:nvPr/>
+            </p:nvSpPr>
+            <p:spPr>
+              <a:xfrm>
+                <a:off x="5680058" y="4473191"/>
+                <a:ext cx="2614093" cy="1106603"/>
+              </a:xfrm>
+              <a:prstGeom prst="flowChartMagneticDisk">
+                <a:avLst/>
+              </a:prstGeom>
+            </p:spPr>
+            <p:style>
+              <a:lnRef idx="1">
+                <a:schemeClr val="accent2"/>
+              </a:lnRef>
+              <a:fillRef idx="2">
+                <a:schemeClr val="accent2"/>
+              </a:fillRef>
+              <a:effectRef idx="1">
+                <a:schemeClr val="accent2"/>
+              </a:effectRef>
+              <a:fontRef idx="minor">
+                <a:schemeClr val="dk1"/>
+              </a:fontRef>
+            </p:style>
+            <p:txBody>
+              <a:bodyPr rtlCol="0" anchor="ctr"/>
+              <a:lstStyle/>
+              <a:p>
+                <a:r>
+                  <a:rPr kumimoji="1" lang="en-US" altLang="ja-JP" sz="1100" dirty="0"/>
+                  <a:t>NFS</a:t>
+                </a:r>
+                <a:endParaRPr kumimoji="1" lang="ja-JP" altLang="en-US" sz="1100" dirty="0"/>
+              </a:p>
+            </p:txBody>
+          </p:sp>
+          <p:sp>
+            <p:nvSpPr>
+              <p:cNvPr id="60" name="フローチャート: 複数書類 59">
+                <a:extLst>
+                  <a:ext uri="{FF2B5EF4-FFF2-40B4-BE49-F238E27FC236}">
+                    <a16:creationId xmlns:a16="http://schemas.microsoft.com/office/drawing/2014/main" id="{0F1E344F-1A43-461B-B9F2-F37B9286CC5F}"/>
+                  </a:ext>
+                </a:extLst>
+              </p:cNvPr>
+              <p:cNvSpPr/>
+              <p:nvPr/>
+            </p:nvSpPr>
+            <p:spPr>
+              <a:xfrm>
+                <a:off x="7024486" y="4887481"/>
+                <a:ext cx="1165081" cy="497649"/>
+              </a:xfrm>
+              <a:prstGeom prst="flowChartMultidocument">
+                <a:avLst/>
+              </a:prstGeom>
+            </p:spPr>
+            <p:style>
+              <a:lnRef idx="1">
+                <a:schemeClr val="accent3"/>
+              </a:lnRef>
+              <a:fillRef idx="2">
+                <a:schemeClr val="accent3"/>
+              </a:fillRef>
+              <a:effectRef idx="1">
+                <a:schemeClr val="accent3"/>
+              </a:effectRef>
+              <a:fontRef idx="minor">
+                <a:schemeClr val="dk1"/>
+              </a:fontRef>
+            </p:style>
+            <p:txBody>
+              <a:bodyPr rtlCol="0" anchor="ctr"/>
+              <a:lstStyle/>
+              <a:p>
+                <a:pPr algn="ctr"/>
+                <a:r>
+                  <a:rPr lang="en-US" altLang="ja-JP" sz="800" dirty="0" err="1"/>
+                  <a:t>CoursewareHub</a:t>
+                </a:r>
+                <a:r>
+                  <a:rPr lang="ja-JP" altLang="en-US" sz="800" dirty="0"/>
+                  <a:t>のコンテンツ</a:t>
+                </a:r>
+              </a:p>
+            </p:txBody>
+          </p:sp>
+          <p:sp>
+            <p:nvSpPr>
+              <p:cNvPr id="103" name="フローチャート: 複数書類 102">
+                <a:extLst>
+                  <a:ext uri="{FF2B5EF4-FFF2-40B4-BE49-F238E27FC236}">
+                    <a16:creationId xmlns:a16="http://schemas.microsoft.com/office/drawing/2014/main" id="{B3458D68-112F-459F-AAB6-2F99641D9D8A}"/>
+                  </a:ext>
+                </a:extLst>
+              </p:cNvPr>
+              <p:cNvSpPr/>
+              <p:nvPr/>
+            </p:nvSpPr>
+            <p:spPr>
+              <a:xfrm>
+                <a:off x="6129483" y="4887481"/>
+                <a:ext cx="790419" cy="497649"/>
+              </a:xfrm>
+              <a:prstGeom prst="flowChartMultidocument">
+                <a:avLst/>
+              </a:prstGeom>
+            </p:spPr>
+            <p:style>
+              <a:lnRef idx="1">
+                <a:schemeClr val="accent3"/>
+              </a:lnRef>
+              <a:fillRef idx="2">
+                <a:schemeClr val="accent3"/>
+              </a:fillRef>
+              <a:effectRef idx="1">
+                <a:schemeClr val="accent3"/>
+              </a:effectRef>
+              <a:fontRef idx="minor">
+                <a:schemeClr val="dk1"/>
+              </a:fontRef>
+            </p:style>
+            <p:txBody>
+              <a:bodyPr rtlCol="0" anchor="ctr"/>
+              <a:lstStyle/>
+              <a:p>
+                <a:pPr algn="ctr"/>
+                <a:r>
+                  <a:rPr lang="en-US" altLang="ja-JP" sz="800" dirty="0"/>
+                  <a:t>DB</a:t>
+                </a:r>
+                <a:r>
+                  <a:rPr lang="ja-JP" altLang="en-US" sz="800" dirty="0"/>
+                  <a:t>データ</a:t>
+                </a:r>
+              </a:p>
+            </p:txBody>
+          </p:sp>
+        </p:grpSp>
+        <p:grpSp>
+          <p:nvGrpSpPr>
+            <p:cNvPr id="120" name="グループ化 119">
+              <a:extLst>
+                <a:ext uri="{FF2B5EF4-FFF2-40B4-BE49-F238E27FC236}">
+                  <a16:creationId xmlns:a16="http://schemas.microsoft.com/office/drawing/2014/main" id="{CB52A80A-F557-4C06-93F5-9382496E624E}"/>
+                </a:ext>
+              </a:extLst>
+            </p:cNvPr>
+            <p:cNvGrpSpPr/>
+            <p:nvPr/>
+          </p:nvGrpSpPr>
+          <p:grpSpPr>
+            <a:xfrm>
+              <a:off x="1485229" y="4833830"/>
+              <a:ext cx="1289236" cy="639386"/>
+              <a:chOff x="4046493" y="1865974"/>
+              <a:chExt cx="1289236" cy="639386"/>
+            </a:xfrm>
+          </p:grpSpPr>
+          <p:sp>
+            <p:nvSpPr>
+              <p:cNvPr id="121" name="正方形/長方形 120">
+                <a:extLst>
+                  <a:ext uri="{FF2B5EF4-FFF2-40B4-BE49-F238E27FC236}">
+                    <a16:creationId xmlns:a16="http://schemas.microsoft.com/office/drawing/2014/main" id="{ECD617F5-89FB-4FC3-9C1F-B2D77147362B}"/>
+                  </a:ext>
+                </a:extLst>
+              </p:cNvPr>
+              <p:cNvSpPr/>
+              <p:nvPr/>
+            </p:nvSpPr>
+            <p:spPr>
+              <a:xfrm>
+                <a:off x="4047083" y="1891244"/>
+                <a:ext cx="218365" cy="134127"/>
+              </a:xfrm>
+              <a:prstGeom prst="rect">
+                <a:avLst/>
+              </a:prstGeom>
+            </p:spPr>
+            <p:style>
+              <a:lnRef idx="1">
+                <a:schemeClr val="accent6"/>
+              </a:lnRef>
+              <a:fillRef idx="2">
+                <a:schemeClr val="accent6"/>
+              </a:fillRef>
+              <a:effectRef idx="1">
+                <a:schemeClr val="accent6"/>
+              </a:effectRef>
+              <a:fontRef idx="minor">
+                <a:schemeClr val="dk1"/>
+              </a:fontRef>
+            </p:style>
+            <p:txBody>
+              <a:bodyPr rtlCol="0" anchor="ctr"/>
+              <a:lstStyle/>
+              <a:p>
+                <a:pPr algn="ctr"/>
+                <a:endParaRPr kumimoji="1" lang="ja-JP" altLang="en-US"/>
+              </a:p>
+            </p:txBody>
+          </p:sp>
+          <p:sp>
+            <p:nvSpPr>
+              <p:cNvPr id="122" name="四角形: 角を丸くする 121">
+                <a:extLst>
+                  <a:ext uri="{FF2B5EF4-FFF2-40B4-BE49-F238E27FC236}">
+                    <a16:creationId xmlns:a16="http://schemas.microsoft.com/office/drawing/2014/main" id="{1996899A-7B79-4D78-9D5C-9D2A07592AE6}"/>
+                  </a:ext>
+                </a:extLst>
+              </p:cNvPr>
+              <p:cNvSpPr/>
+              <p:nvPr/>
+            </p:nvSpPr>
+            <p:spPr>
+              <a:xfrm>
+                <a:off x="4047083" y="2118999"/>
+                <a:ext cx="218365" cy="134127"/>
+              </a:xfrm>
+              <a:prstGeom prst="roundRect">
+                <a:avLst/>
+              </a:prstGeom>
+            </p:spPr>
+            <p:style>
+              <a:lnRef idx="1">
+                <a:schemeClr val="accent4"/>
+              </a:lnRef>
+              <a:fillRef idx="2">
+                <a:schemeClr val="accent4"/>
+              </a:fillRef>
+              <a:effectRef idx="1">
+                <a:schemeClr val="accent4"/>
+              </a:effectRef>
+              <a:fontRef idx="minor">
+                <a:schemeClr val="dk1"/>
+              </a:fontRef>
+            </p:style>
+            <p:txBody>
+              <a:bodyPr rtlCol="0" anchor="ctr"/>
+              <a:lstStyle/>
+              <a:p>
+                <a:pPr algn="ctr"/>
+                <a:endParaRPr kumimoji="1" lang="ja-JP" altLang="en-US"/>
+              </a:p>
+            </p:txBody>
+          </p:sp>
+          <p:sp>
+            <p:nvSpPr>
+              <p:cNvPr id="123" name="テキスト ボックス 122">
+                <a:extLst>
+                  <a:ext uri="{FF2B5EF4-FFF2-40B4-BE49-F238E27FC236}">
+                    <a16:creationId xmlns:a16="http://schemas.microsoft.com/office/drawing/2014/main" id="{CFF44C0F-8E26-4ABA-A130-1635116CEBD1}"/>
+                  </a:ext>
+                </a:extLst>
+              </p:cNvPr>
+              <p:cNvSpPr txBox="1"/>
+              <p:nvPr/>
+            </p:nvSpPr>
+            <p:spPr>
+              <a:xfrm>
+                <a:off x="4224905" y="1865974"/>
+                <a:ext cx="554822" cy="184666"/>
+              </a:xfrm>
+              <a:prstGeom prst="rect">
+                <a:avLst/>
+              </a:prstGeom>
+              <a:noFill/>
+            </p:spPr>
+            <p:txBody>
+              <a:bodyPr wrap="square" rtlCol="0">
+                <a:spAutoFit/>
+              </a:bodyPr>
+              <a:lstStyle/>
+              <a:p>
+                <a:r>
+                  <a:rPr kumimoji="1" lang="ja-JP" altLang="en-US" sz="600" dirty="0"/>
+                  <a:t>コンテナ</a:t>
+                </a:r>
+              </a:p>
+            </p:txBody>
+          </p:sp>
+          <p:sp>
+            <p:nvSpPr>
+              <p:cNvPr id="124" name="テキスト ボックス 123">
+                <a:extLst>
+                  <a:ext uri="{FF2B5EF4-FFF2-40B4-BE49-F238E27FC236}">
+                    <a16:creationId xmlns:a16="http://schemas.microsoft.com/office/drawing/2014/main" id="{92FB23CC-B868-44D1-BF50-E47370EE6DE7}"/>
+                  </a:ext>
+                </a:extLst>
+              </p:cNvPr>
+              <p:cNvSpPr txBox="1"/>
+              <p:nvPr/>
+            </p:nvSpPr>
+            <p:spPr>
+              <a:xfrm>
+                <a:off x="4224904" y="2093729"/>
+                <a:ext cx="1110825" cy="184666"/>
+              </a:xfrm>
+              <a:prstGeom prst="rect">
+                <a:avLst/>
+              </a:prstGeom>
+              <a:noFill/>
+            </p:spPr>
+            <p:txBody>
+              <a:bodyPr wrap="square" rtlCol="0">
+                <a:spAutoFit/>
+              </a:bodyPr>
+              <a:lstStyle/>
+              <a:p>
+                <a:r>
+                  <a:rPr kumimoji="1" lang="ja-JP" altLang="en-US" sz="600" dirty="0"/>
+                  <a:t>ソフトウェアモジュール</a:t>
+                </a:r>
+              </a:p>
+            </p:txBody>
+          </p:sp>
+          <p:sp>
+            <p:nvSpPr>
+              <p:cNvPr id="127" name="フローチャート: 磁気ディスク 126">
+                <a:extLst>
+                  <a:ext uri="{FF2B5EF4-FFF2-40B4-BE49-F238E27FC236}">
+                    <a16:creationId xmlns:a16="http://schemas.microsoft.com/office/drawing/2014/main" id="{E004A088-EAB6-4631-A26D-C05A6553B49E}"/>
+                  </a:ext>
+                </a:extLst>
+              </p:cNvPr>
+              <p:cNvSpPr/>
+              <p:nvPr/>
+            </p:nvSpPr>
+            <p:spPr>
+              <a:xfrm>
+                <a:off x="4046493" y="2345964"/>
+                <a:ext cx="218365" cy="134127"/>
+              </a:xfrm>
+              <a:prstGeom prst="flowChartMagneticDisk">
+                <a:avLst/>
+              </a:prstGeom>
+            </p:spPr>
+            <p:style>
+              <a:lnRef idx="1">
+                <a:schemeClr val="accent2"/>
+              </a:lnRef>
+              <a:fillRef idx="2">
+                <a:schemeClr val="accent2"/>
+              </a:fillRef>
+              <a:effectRef idx="1">
+                <a:schemeClr val="accent2"/>
+              </a:effectRef>
+              <a:fontRef idx="minor">
+                <a:schemeClr val="dk1"/>
+              </a:fontRef>
+            </p:style>
+            <p:txBody>
+              <a:bodyPr rtlCol="0" anchor="ctr"/>
+              <a:lstStyle/>
+              <a:p>
+                <a:pPr algn="ctr"/>
+                <a:endParaRPr kumimoji="1" lang="ja-JP" altLang="en-US"/>
+              </a:p>
+            </p:txBody>
+          </p:sp>
+          <p:sp>
+            <p:nvSpPr>
+              <p:cNvPr id="128" name="テキスト ボックス 127">
+                <a:extLst>
+                  <a:ext uri="{FF2B5EF4-FFF2-40B4-BE49-F238E27FC236}">
+                    <a16:creationId xmlns:a16="http://schemas.microsoft.com/office/drawing/2014/main" id="{178CB759-BB11-4A1C-B03C-1EAB7FAE23D9}"/>
+                  </a:ext>
+                </a:extLst>
+              </p:cNvPr>
+              <p:cNvSpPr txBox="1"/>
+              <p:nvPr/>
+            </p:nvSpPr>
+            <p:spPr>
+              <a:xfrm>
+                <a:off x="4224314" y="2320694"/>
+                <a:ext cx="735920" cy="184666"/>
+              </a:xfrm>
+              <a:prstGeom prst="rect">
+                <a:avLst/>
+              </a:prstGeom>
+              <a:noFill/>
+            </p:spPr>
+            <p:txBody>
+              <a:bodyPr wrap="square" rtlCol="0">
+                <a:spAutoFit/>
+              </a:bodyPr>
+              <a:lstStyle/>
+              <a:p>
+                <a:r>
+                  <a:rPr kumimoji="1" lang="ja-JP" altLang="en-US" sz="600" dirty="0"/>
+                  <a:t>ストレージ</a:t>
+                </a:r>
+              </a:p>
+            </p:txBody>
+          </p:sp>
+        </p:grpSp>
+        <p:sp>
+          <p:nvSpPr>
+            <p:cNvPr id="74" name="正方形/長方形 73">
+              <a:extLst>
+                <a:ext uri="{FF2B5EF4-FFF2-40B4-BE49-F238E27FC236}">
+                  <a16:creationId xmlns:a16="http://schemas.microsoft.com/office/drawing/2014/main" id="{B500B6DF-5629-4B2A-99CC-5D3EC5EC3ED7}"/>
+                </a:ext>
+              </a:extLst>
+            </p:cNvPr>
+            <p:cNvSpPr/>
+            <p:nvPr/>
+          </p:nvSpPr>
+          <p:spPr>
+            <a:xfrm>
+              <a:off x="2734852" y="1247790"/>
+              <a:ext cx="4824189" cy="4362421"/>
+            </a:xfrm>
+            <a:prstGeom prst="rect">
+              <a:avLst/>
+            </a:prstGeom>
+            <a:noFill/>
+            <a:ln w="38100">
+              <a:solidFill>
+                <a:schemeClr val="accent3">
+                  <a:lumMod val="60000"/>
+                  <a:lumOff val="40000"/>
+                </a:schemeClr>
+              </a:solidFill>
+              <a:prstDash val="sysDash"/>
+            </a:ln>
+          </p:spPr>
+          <p:style>
+            <a:lnRef idx="0">
+              <a:scrgbClr r="0" g="0" b="0"/>
+            </a:lnRef>
+            <a:fillRef idx="0">
+              <a:scrgbClr r="0" g="0" b="0"/>
+            </a:fillRef>
+            <a:effectRef idx="0">
+              <a:scrgbClr r="0" g="0" b="0"/>
+            </a:effectRef>
+            <a:fontRef idx="minor">
+              <a:schemeClr val="lt1"/>
+            </a:fontRef>
+          </p:style>
+          <p:txBody>
+            <a:bodyPr rtlCol="0" anchor="t"/>
+            <a:lstStyle/>
+            <a:p>
+              <a:pPr algn="ctr"/>
+              <a:r>
+                <a:rPr kumimoji="1" lang="ja-JP" altLang="en-US" sz="1200" dirty="0">
+                  <a:solidFill>
+                    <a:schemeClr val="tx1"/>
+                  </a:solidFill>
+                </a:rPr>
+                <a:t>ハブサーバ</a:t>
+              </a:r>
+            </a:p>
+          </p:txBody>
+        </p:sp>
+        <p:cxnSp>
+          <p:nvCxnSpPr>
+            <p:cNvPr id="90" name="コネクタ: カギ線 89">
+              <a:extLst>
+                <a:ext uri="{FF2B5EF4-FFF2-40B4-BE49-F238E27FC236}">
+                  <a16:creationId xmlns:a16="http://schemas.microsoft.com/office/drawing/2014/main" id="{20759133-2560-4F12-97D6-47D39BD3B20C}"/>
+                </a:ext>
+              </a:extLst>
+            </p:cNvPr>
+            <p:cNvCxnSpPr>
+              <a:cxnSpLocks/>
+              <a:stCxn id="5" idx="3"/>
+              <a:endCxn id="9" idx="1"/>
+            </p:cNvCxnSpPr>
+            <p:nvPr/>
+          </p:nvCxnSpPr>
+          <p:spPr>
+            <a:xfrm flipV="1">
+              <a:off x="6660306" y="1916781"/>
+              <a:ext cx="1511124" cy="844466"/>
+            </a:xfrm>
+            <a:prstGeom prst="bentConnector3">
+              <a:avLst>
+                <a:gd name="adj1" fmla="val 50000"/>
+              </a:avLst>
+            </a:prstGeom>
+          </p:spPr>
+          <p:style>
+            <a:lnRef idx="1">
+              <a:schemeClr val="accent1"/>
+            </a:lnRef>
+            <a:fillRef idx="0">
+              <a:schemeClr val="accent1"/>
+            </a:fillRef>
+            <a:effectRef idx="0">
+              <a:schemeClr val="accent1"/>
+            </a:effectRef>
+            <a:fontRef idx="minor">
+              <a:schemeClr val="tx1"/>
+            </a:fontRef>
+          </p:style>
+        </p:cxnSp>
+        <p:sp>
+          <p:nvSpPr>
+            <p:cNvPr id="62" name="テキスト ボックス 61">
+              <a:extLst>
+                <a:ext uri="{FF2B5EF4-FFF2-40B4-BE49-F238E27FC236}">
+                  <a16:creationId xmlns:a16="http://schemas.microsoft.com/office/drawing/2014/main" id="{0669C013-B9BF-4910-A62C-3F809AD25BBB}"/>
+                </a:ext>
+              </a:extLst>
+            </p:cNvPr>
+            <p:cNvSpPr txBox="1"/>
+            <p:nvPr/>
+          </p:nvSpPr>
+          <p:spPr>
+            <a:xfrm>
+              <a:off x="8044261" y="4849000"/>
+              <a:ext cx="1448681" cy="430887"/>
+            </a:xfrm>
+            <a:prstGeom prst="rect">
+              <a:avLst/>
+            </a:prstGeom>
+            <a:noFill/>
+          </p:spPr>
+          <p:txBody>
+            <a:bodyPr wrap="square" rtlCol="0">
+              <a:spAutoFit/>
+            </a:bodyPr>
+            <a:lstStyle/>
+            <a:p>
+              <a:r>
+                <a:rPr kumimoji="1" lang="ja-JP" altLang="en-US" sz="1100" dirty="0"/>
+                <a:t>ユーザ毎の</a:t>
+              </a:r>
+              <a:r>
+                <a:rPr kumimoji="1" lang="en-US" altLang="ja-JP" sz="1100" dirty="0" err="1"/>
+                <a:t>Jupyter</a:t>
+              </a:r>
+              <a:r>
+                <a:rPr kumimoji="1" lang="en-US" altLang="ja-JP" sz="1100" dirty="0"/>
+                <a:t> Notebook</a:t>
+              </a:r>
+              <a:r>
+                <a:rPr kumimoji="1" lang="ja-JP" altLang="en-US" sz="1100" dirty="0"/>
+                <a:t>環境</a:t>
+              </a:r>
+            </a:p>
+          </p:txBody>
+        </p:sp>
+      </p:grpSp>
+    </p:spTree>
+    <p:extLst>
+      <p:ext uri="{BB962C8B-B14F-4D97-AF65-F5344CB8AC3E}">
+        <p14:creationId xmlns:p14="http://schemas.microsoft.com/office/powerpoint/2010/main" val="2860681729"/>
+      </p:ext>
+    </p:extLst>
+  </p:cSld>
+  <p:clrMapOvr>
+    <a:masterClrMapping/>
+  </p:clrMapOvr>
+</p:sld>
+</file>
+
+<file path=ppt/slides/slide2.xml><?xml version="1.0" encoding="utf-8"?>
+<p:sld xmlns:a="http://schemas.openxmlformats.org/drawingml/2006/main" xmlns:r="http://schemas.openxmlformats.org/officeDocument/2006/relationships" xmlns:p="http://schemas.openxmlformats.org/presentationml/2006/main">
+  <p:cSld>
+    <p:spTree>
+      <p:nvGrpSpPr>
+        <p:cNvPr id="1" name=""/>
+        <p:cNvGrpSpPr/>
+        <p:nvPr/>
+      </p:nvGrpSpPr>
+      <p:grpSpPr>
+        <a:xfrm>
+          <a:off x="0" y="0"/>
+          <a:ext cx="0" cy="0"/>
+          <a:chOff x="0" y="0"/>
+          <a:chExt cx="0" cy="0"/>
+        </a:xfrm>
+      </p:grpSpPr>
+      <p:grpSp>
+        <p:nvGrpSpPr>
+          <p:cNvPr id="36" name="グループ化 35">
+            <a:extLst>
+              <a:ext uri="{FF2B5EF4-FFF2-40B4-BE49-F238E27FC236}">
+                <a16:creationId xmlns:a16="http://schemas.microsoft.com/office/drawing/2014/main" id="{D9A82EB8-94EA-402C-AA9E-D02EC46A4941}"/>
+              </a:ext>
+            </a:extLst>
+          </p:cNvPr>
+          <p:cNvGrpSpPr/>
+          <p:nvPr/>
+        </p:nvGrpSpPr>
+        <p:grpSpPr>
+          <a:xfrm>
+            <a:off x="508000" y="1715286"/>
+            <a:ext cx="11506756" cy="3714670"/>
+            <a:chOff x="508000" y="1715286"/>
+            <a:chExt cx="11506756" cy="3714670"/>
+          </a:xfrm>
+        </p:grpSpPr>
+        <p:sp>
+          <p:nvSpPr>
+            <p:cNvPr id="58" name="テキスト ボックス 57">
+              <a:extLst>
+                <a:ext uri="{FF2B5EF4-FFF2-40B4-BE49-F238E27FC236}">
+                  <a16:creationId xmlns:a16="http://schemas.microsoft.com/office/drawing/2014/main" id="{56FC6E7A-E673-41F4-A926-12F5E58B06E2}"/>
+                </a:ext>
+              </a:extLst>
+            </p:cNvPr>
+            <p:cNvSpPr txBox="1"/>
+            <p:nvPr/>
+          </p:nvSpPr>
+          <p:spPr>
+            <a:xfrm>
+              <a:off x="10201624" y="1730129"/>
+              <a:ext cx="1813132" cy="461665"/>
+            </a:xfrm>
+            <a:prstGeom prst="rect">
+              <a:avLst/>
+            </a:prstGeom>
+            <a:noFill/>
+          </p:spPr>
+          <p:txBody>
+            <a:bodyPr wrap="square" rtlCol="0">
+              <a:spAutoFit/>
+            </a:bodyPr>
+            <a:lstStyle/>
+            <a:p>
+              <a:r>
+                <a:rPr lang="en-US" altLang="ja-JP" sz="1200" dirty="0">
+                  <a:solidFill>
+                    <a:schemeClr val="accent6">
+                      <a:lumMod val="75000"/>
+                    </a:schemeClr>
+                  </a:solidFill>
+                </a:rPr>
+                <a:t>Application Container  network(overlay)</a:t>
+              </a:r>
+              <a:endParaRPr kumimoji="1" lang="ja-JP" altLang="en-US" sz="1200" dirty="0">
+                <a:solidFill>
+                  <a:schemeClr val="accent6">
+                    <a:lumMod val="75000"/>
+                  </a:schemeClr>
+                </a:solidFill>
+              </a:endParaRPr>
+            </a:p>
+          </p:txBody>
+        </p:sp>
+        <p:sp>
+          <p:nvSpPr>
+            <p:cNvPr id="11" name="フローチャート: 磁気ディスク 10">
+              <a:extLst>
+                <a:ext uri="{FF2B5EF4-FFF2-40B4-BE49-F238E27FC236}">
+                  <a16:creationId xmlns:a16="http://schemas.microsoft.com/office/drawing/2014/main" id="{585DCCB2-BDCF-42D9-85D6-335AE9BFE19C}"/>
+                </a:ext>
+              </a:extLst>
+            </p:cNvPr>
+            <p:cNvSpPr/>
+            <p:nvPr/>
+          </p:nvSpPr>
+          <p:spPr>
+            <a:xfrm>
+              <a:off x="3587042" y="4126085"/>
+              <a:ext cx="1230489" cy="677333"/>
+            </a:xfrm>
+            <a:prstGeom prst="flowChartMagneticDisk">
+              <a:avLst/>
+            </a:prstGeom>
+          </p:spPr>
+          <p:style>
+            <a:lnRef idx="1">
+              <a:schemeClr val="accent2"/>
+            </a:lnRef>
+            <a:fillRef idx="2">
+              <a:schemeClr val="accent2"/>
+            </a:fillRef>
+            <a:effectRef idx="1">
+              <a:schemeClr val="accent2"/>
+            </a:effectRef>
+            <a:fontRef idx="minor">
+              <a:schemeClr val="dk1"/>
+            </a:fontRef>
+          </p:style>
+          <p:txBody>
+            <a:bodyPr rtlCol="0" anchor="ctr"/>
+            <a:lstStyle/>
+            <a:p>
+              <a:pPr algn="ctr"/>
+              <a:r>
+                <a:rPr kumimoji="1" lang="en-US" altLang="ja-JP" dirty="0"/>
+                <a:t>NFS</a:t>
+              </a:r>
+              <a:r>
+                <a:rPr kumimoji="1" lang="ja-JP" altLang="en-US" dirty="0"/>
+                <a:t>用ディスク</a:t>
+              </a:r>
+            </a:p>
+          </p:txBody>
+        </p:sp>
+        <p:grpSp>
+          <p:nvGrpSpPr>
+            <p:cNvPr id="7" name="グループ化 6">
+              <a:extLst>
+                <a:ext uri="{FF2B5EF4-FFF2-40B4-BE49-F238E27FC236}">
+                  <a16:creationId xmlns:a16="http://schemas.microsoft.com/office/drawing/2014/main" id="{1FF9EE4B-C5E5-4EA4-9B85-9DDA48A34073}"/>
+                </a:ext>
+              </a:extLst>
+            </p:cNvPr>
+            <p:cNvGrpSpPr/>
+            <p:nvPr/>
+          </p:nvGrpSpPr>
+          <p:grpSpPr>
+            <a:xfrm>
+              <a:off x="886175" y="2277248"/>
+              <a:ext cx="2897858" cy="2526170"/>
+              <a:chOff x="2314221" y="2277252"/>
+              <a:chExt cx="2897858" cy="2526170"/>
+            </a:xfrm>
+          </p:grpSpPr>
+          <p:sp>
+            <p:nvSpPr>
+              <p:cNvPr id="4" name="正方形/長方形 3">
+                <a:extLst>
+                  <a:ext uri="{FF2B5EF4-FFF2-40B4-BE49-F238E27FC236}">
+                    <a16:creationId xmlns:a16="http://schemas.microsoft.com/office/drawing/2014/main" id="{B4EB1DDA-C46C-45AE-8BC5-9315AAFD5E91}"/>
+                  </a:ext>
+                </a:extLst>
+              </p:cNvPr>
+              <p:cNvSpPr/>
+              <p:nvPr/>
+            </p:nvSpPr>
+            <p:spPr>
+              <a:xfrm>
+                <a:off x="2314223" y="3429001"/>
+                <a:ext cx="2404533" cy="677333"/>
+              </a:xfrm>
+              <a:prstGeom prst="rect">
+                <a:avLst/>
+              </a:prstGeom>
+            </p:spPr>
+            <p:style>
+              <a:lnRef idx="1">
+                <a:schemeClr val="accent1"/>
+              </a:lnRef>
+              <a:fillRef idx="2">
+                <a:schemeClr val="accent1"/>
+              </a:fillRef>
+              <a:effectRef idx="1">
+                <a:schemeClr val="accent1"/>
+              </a:effectRef>
+              <a:fontRef idx="minor">
+                <a:schemeClr val="dk1"/>
+              </a:fontRef>
+            </p:style>
+            <p:txBody>
+              <a:bodyPr rtlCol="0" anchor="ctr"/>
+              <a:lstStyle/>
+              <a:p>
+                <a:pPr algn="ctr"/>
+                <a:r>
+                  <a:rPr kumimoji="1" lang="en-US" altLang="ja-JP" dirty="0"/>
+                  <a:t>Base-C(Hub server)</a:t>
+                </a:r>
+                <a:endParaRPr kumimoji="1" lang="ja-JP" altLang="en-US" dirty="0"/>
+              </a:p>
+            </p:txBody>
+          </p:sp>
+          <p:sp>
+            <p:nvSpPr>
+              <p:cNvPr id="8" name="正方形/長方形 7">
+                <a:extLst>
+                  <a:ext uri="{FF2B5EF4-FFF2-40B4-BE49-F238E27FC236}">
+                    <a16:creationId xmlns:a16="http://schemas.microsoft.com/office/drawing/2014/main" id="{FDD96AFF-7076-43EE-9C81-2B477FCB2181}"/>
+                  </a:ext>
+                </a:extLst>
+              </p:cNvPr>
+              <p:cNvSpPr/>
+              <p:nvPr/>
+            </p:nvSpPr>
+            <p:spPr>
+              <a:xfrm>
+                <a:off x="2314222" y="4126089"/>
+                <a:ext cx="2404533" cy="677333"/>
+              </a:xfrm>
+              <a:prstGeom prst="rect">
+                <a:avLst/>
+              </a:prstGeom>
+            </p:spPr>
+            <p:style>
+              <a:lnRef idx="1">
+                <a:schemeClr val="accent4"/>
+              </a:lnRef>
+              <a:fillRef idx="2">
+                <a:schemeClr val="accent4"/>
+              </a:fillRef>
+              <a:effectRef idx="1">
+                <a:schemeClr val="accent4"/>
+              </a:effectRef>
+              <a:fontRef idx="minor">
+                <a:schemeClr val="dk1"/>
+              </a:fontRef>
+            </p:style>
+            <p:txBody>
+              <a:bodyPr rtlCol="0" anchor="ctr"/>
+              <a:lstStyle/>
+              <a:p>
+                <a:pPr algn="ctr"/>
+                <a:r>
+                  <a:rPr kumimoji="1" lang="en-US" altLang="ja-JP" dirty="0"/>
+                  <a:t>VM</a:t>
+                </a:r>
+                <a:endParaRPr kumimoji="1" lang="ja-JP" altLang="en-US" dirty="0"/>
+              </a:p>
+            </p:txBody>
+          </p:sp>
+          <p:sp>
+            <p:nvSpPr>
+              <p:cNvPr id="12" name="正方形/長方形 11">
+                <a:extLst>
+                  <a:ext uri="{FF2B5EF4-FFF2-40B4-BE49-F238E27FC236}">
+                    <a16:creationId xmlns:a16="http://schemas.microsoft.com/office/drawing/2014/main" id="{071216A3-00D0-4DFE-8484-504B228B37DC}"/>
+                  </a:ext>
+                </a:extLst>
+              </p:cNvPr>
+              <p:cNvSpPr/>
+              <p:nvPr/>
+            </p:nvSpPr>
+            <p:spPr>
+              <a:xfrm>
+                <a:off x="2314221" y="2277252"/>
+                <a:ext cx="1151467" cy="677335"/>
+              </a:xfrm>
+              <a:prstGeom prst="rect">
+                <a:avLst/>
+              </a:prstGeom>
+            </p:spPr>
+            <p:style>
+              <a:lnRef idx="1">
+                <a:schemeClr val="accent6"/>
+              </a:lnRef>
+              <a:fillRef idx="2">
+                <a:schemeClr val="accent6"/>
+              </a:fillRef>
+              <a:effectRef idx="1">
+                <a:schemeClr val="accent6"/>
+              </a:effectRef>
+              <a:fontRef idx="minor">
+                <a:schemeClr val="dk1"/>
+              </a:fontRef>
+            </p:style>
+            <p:txBody>
+              <a:bodyPr rtlCol="0" anchor="ctr"/>
+              <a:lstStyle/>
+              <a:p>
+                <a:pPr algn="ctr"/>
+                <a:r>
+                  <a:rPr kumimoji="1" lang="en-US" altLang="ja-JP" sz="1400" dirty="0"/>
+                  <a:t>proxy</a:t>
+                </a:r>
+                <a:endParaRPr kumimoji="1" lang="ja-JP" altLang="en-US" sz="1400" dirty="0"/>
+              </a:p>
+            </p:txBody>
+          </p:sp>
+          <p:sp>
+            <p:nvSpPr>
+              <p:cNvPr id="13" name="正方形/長方形 12">
+                <a:extLst>
+                  <a:ext uri="{FF2B5EF4-FFF2-40B4-BE49-F238E27FC236}">
+                    <a16:creationId xmlns:a16="http://schemas.microsoft.com/office/drawing/2014/main" id="{302D1EB3-3528-48E9-B13B-D0AB6B00358A}"/>
+                  </a:ext>
+                </a:extLst>
+              </p:cNvPr>
+              <p:cNvSpPr/>
+              <p:nvPr/>
+            </p:nvSpPr>
+            <p:spPr>
+              <a:xfrm>
+                <a:off x="4060612" y="2277252"/>
+                <a:ext cx="1151467" cy="677335"/>
+              </a:xfrm>
+              <a:prstGeom prst="rect">
+                <a:avLst/>
+              </a:prstGeom>
+            </p:spPr>
+            <p:style>
+              <a:lnRef idx="1">
+                <a:schemeClr val="accent6"/>
+              </a:lnRef>
+              <a:fillRef idx="2">
+                <a:schemeClr val="accent6"/>
+              </a:fillRef>
+              <a:effectRef idx="1">
+                <a:schemeClr val="accent6"/>
+              </a:effectRef>
+              <a:fontRef idx="minor">
+                <a:schemeClr val="dk1"/>
+              </a:fontRef>
+            </p:style>
+            <p:txBody>
+              <a:bodyPr rtlCol="0" anchor="ctr"/>
+              <a:lstStyle/>
+              <a:p>
+                <a:pPr algn="ctr"/>
+                <a:r>
+                  <a:rPr kumimoji="1" lang="en-US" altLang="ja-JP" sz="1400" dirty="0" err="1"/>
+                  <a:t>JupyterHub</a:t>
+                </a:r>
+                <a:endParaRPr kumimoji="1" lang="ja-JP" altLang="en-US" sz="1400" dirty="0"/>
+              </a:p>
+            </p:txBody>
+          </p:sp>
+        </p:grpSp>
+        <p:grpSp>
+          <p:nvGrpSpPr>
+            <p:cNvPr id="22" name="グループ化 21">
+              <a:extLst>
+                <a:ext uri="{FF2B5EF4-FFF2-40B4-BE49-F238E27FC236}">
+                  <a16:creationId xmlns:a16="http://schemas.microsoft.com/office/drawing/2014/main" id="{9D2DD514-62CA-41E2-B757-E138A4264EB0}"/>
+                </a:ext>
+              </a:extLst>
+            </p:cNvPr>
+            <p:cNvGrpSpPr/>
+            <p:nvPr/>
+          </p:nvGrpSpPr>
+          <p:grpSpPr>
+            <a:xfrm>
+              <a:off x="4378957" y="2275118"/>
+              <a:ext cx="3365221" cy="2528304"/>
+              <a:chOff x="4378957" y="2275118"/>
+              <a:chExt cx="3365221" cy="2528304"/>
+            </a:xfrm>
+          </p:grpSpPr>
+          <p:sp>
+            <p:nvSpPr>
+              <p:cNvPr id="5" name="正方形/長方形 4">
+                <a:extLst>
+                  <a:ext uri="{FF2B5EF4-FFF2-40B4-BE49-F238E27FC236}">
+                    <a16:creationId xmlns:a16="http://schemas.microsoft.com/office/drawing/2014/main" id="{3A98A01C-D181-44F2-8B9C-798D6A49BFBE}"/>
+                  </a:ext>
+                </a:extLst>
+              </p:cNvPr>
+              <p:cNvSpPr/>
+              <p:nvPr/>
+            </p:nvSpPr>
+            <p:spPr>
+              <a:xfrm>
+                <a:off x="5339645" y="3429001"/>
+                <a:ext cx="2404533" cy="677333"/>
+              </a:xfrm>
+              <a:prstGeom prst="rect">
+                <a:avLst/>
+              </a:prstGeom>
+            </p:spPr>
+            <p:style>
+              <a:lnRef idx="1">
+                <a:schemeClr val="accent1"/>
+              </a:lnRef>
+              <a:fillRef idx="2">
+                <a:schemeClr val="accent1"/>
+              </a:fillRef>
+              <a:effectRef idx="1">
+                <a:schemeClr val="accent1"/>
+              </a:effectRef>
+              <a:fontRef idx="minor">
+                <a:schemeClr val="dk1"/>
+              </a:fontRef>
+            </p:style>
+            <p:txBody>
+              <a:bodyPr rtlCol="0" anchor="ctr"/>
+              <a:lstStyle/>
+              <a:p>
+                <a:pPr algn="ctr"/>
+                <a:r>
+                  <a:rPr kumimoji="1" lang="en-US" altLang="ja-JP" sz="1600" dirty="0"/>
+                  <a:t>Base-C(Node server)</a:t>
+                </a:r>
+                <a:endParaRPr kumimoji="1" lang="ja-JP" altLang="en-US" sz="1600" dirty="0"/>
+              </a:p>
+            </p:txBody>
+          </p:sp>
+          <p:sp>
+            <p:nvSpPr>
+              <p:cNvPr id="9" name="正方形/長方形 8">
+                <a:extLst>
+                  <a:ext uri="{FF2B5EF4-FFF2-40B4-BE49-F238E27FC236}">
+                    <a16:creationId xmlns:a16="http://schemas.microsoft.com/office/drawing/2014/main" id="{E6C9ECC4-DB98-4C5C-9D3F-6A08463C5842}"/>
+                  </a:ext>
+                </a:extLst>
+              </p:cNvPr>
+              <p:cNvSpPr/>
+              <p:nvPr/>
+            </p:nvSpPr>
+            <p:spPr>
+              <a:xfrm>
+                <a:off x="5339644" y="4126089"/>
+                <a:ext cx="2404533" cy="677333"/>
+              </a:xfrm>
+              <a:prstGeom prst="rect">
+                <a:avLst/>
+              </a:prstGeom>
+            </p:spPr>
+            <p:style>
+              <a:lnRef idx="1">
+                <a:schemeClr val="accent4"/>
+              </a:lnRef>
+              <a:fillRef idx="2">
+                <a:schemeClr val="accent4"/>
+              </a:fillRef>
+              <a:effectRef idx="1">
+                <a:schemeClr val="accent4"/>
+              </a:effectRef>
+              <a:fontRef idx="minor">
+                <a:schemeClr val="dk1"/>
+              </a:fontRef>
+            </p:style>
+            <p:txBody>
+              <a:bodyPr rtlCol="0" anchor="ctr"/>
+              <a:lstStyle/>
+              <a:p>
+                <a:pPr algn="ctr"/>
+                <a:r>
+                  <a:rPr kumimoji="1" lang="en-US" altLang="ja-JP" dirty="0"/>
+                  <a:t>VM</a:t>
+                </a:r>
+                <a:endParaRPr kumimoji="1" lang="ja-JP" altLang="en-US" dirty="0"/>
+              </a:p>
+            </p:txBody>
+          </p:sp>
+          <p:sp>
+            <p:nvSpPr>
+              <p:cNvPr id="14" name="正方形/長方形 13">
+                <a:extLst>
+                  <a:ext uri="{FF2B5EF4-FFF2-40B4-BE49-F238E27FC236}">
+                    <a16:creationId xmlns:a16="http://schemas.microsoft.com/office/drawing/2014/main" id="{CA3E01FB-D2E4-4A9C-B4EE-4B83FC1DB7D6}"/>
+                  </a:ext>
+                </a:extLst>
+              </p:cNvPr>
+              <p:cNvSpPr/>
+              <p:nvPr/>
+            </p:nvSpPr>
+            <p:spPr>
+              <a:xfrm>
+                <a:off x="6125348" y="2275118"/>
+                <a:ext cx="1151467" cy="677335"/>
+              </a:xfrm>
+              <a:prstGeom prst="rect">
+                <a:avLst/>
+              </a:prstGeom>
+            </p:spPr>
+            <p:style>
+              <a:lnRef idx="1">
+                <a:schemeClr val="accent6"/>
+              </a:lnRef>
+              <a:fillRef idx="2">
+                <a:schemeClr val="accent6"/>
+              </a:fillRef>
+              <a:effectRef idx="1">
+                <a:schemeClr val="accent6"/>
+              </a:effectRef>
+              <a:fontRef idx="minor">
+                <a:schemeClr val="dk1"/>
+              </a:fontRef>
+            </p:style>
+            <p:txBody>
+              <a:bodyPr rtlCol="0" anchor="ctr"/>
+              <a:lstStyle/>
+              <a:p>
+                <a:pPr algn="ctr"/>
+                <a:r>
+                  <a:rPr lang="en-US" altLang="ja-JP" sz="1400" dirty="0"/>
+                  <a:t>single u</a:t>
+                </a:r>
+                <a:r>
+                  <a:rPr kumimoji="1" lang="en-US" altLang="ja-JP" sz="1400" dirty="0"/>
+                  <a:t>ser Container</a:t>
+                </a:r>
+                <a:endParaRPr kumimoji="1" lang="ja-JP" altLang="en-US" sz="1400" dirty="0"/>
+              </a:p>
+            </p:txBody>
+          </p:sp>
+          <p:sp>
+            <p:nvSpPr>
+              <p:cNvPr id="15" name="正方形/長方形 14">
+                <a:extLst>
+                  <a:ext uri="{FF2B5EF4-FFF2-40B4-BE49-F238E27FC236}">
+                    <a16:creationId xmlns:a16="http://schemas.microsoft.com/office/drawing/2014/main" id="{BAE4184E-71ED-461E-81BB-610A7A9DD87F}"/>
+                  </a:ext>
+                </a:extLst>
+              </p:cNvPr>
+              <p:cNvSpPr/>
+              <p:nvPr/>
+            </p:nvSpPr>
+            <p:spPr>
+              <a:xfrm>
+                <a:off x="4378957" y="2275118"/>
+                <a:ext cx="1151467" cy="677335"/>
+              </a:xfrm>
+              <a:prstGeom prst="rect">
+                <a:avLst/>
+              </a:prstGeom>
+            </p:spPr>
+            <p:style>
+              <a:lnRef idx="1">
+                <a:schemeClr val="accent6"/>
+              </a:lnRef>
+              <a:fillRef idx="2">
+                <a:schemeClr val="accent6"/>
+              </a:fillRef>
+              <a:effectRef idx="1">
+                <a:schemeClr val="accent6"/>
+              </a:effectRef>
+              <a:fontRef idx="minor">
+                <a:schemeClr val="dk1"/>
+              </a:fontRef>
+            </p:style>
+            <p:txBody>
+              <a:bodyPr rtlCol="0" anchor="ctr"/>
+              <a:lstStyle/>
+              <a:p>
+                <a:pPr algn="ctr"/>
+                <a:r>
+                  <a:rPr kumimoji="1" lang="en-US" altLang="ja-JP" sz="1200" dirty="0"/>
+                  <a:t>PostgreSQL</a:t>
+                </a:r>
+                <a:endParaRPr kumimoji="1" lang="ja-JP" altLang="en-US" sz="1200" dirty="0"/>
+              </a:p>
+            </p:txBody>
+          </p:sp>
+        </p:grpSp>
+        <p:grpSp>
+          <p:nvGrpSpPr>
+            <p:cNvPr id="26" name="グループ化 25">
+              <a:extLst>
+                <a:ext uri="{FF2B5EF4-FFF2-40B4-BE49-F238E27FC236}">
+                  <a16:creationId xmlns:a16="http://schemas.microsoft.com/office/drawing/2014/main" id="{DFCE9384-47BD-4B7B-8060-4B968F55E56F}"/>
+                </a:ext>
+              </a:extLst>
+            </p:cNvPr>
+            <p:cNvGrpSpPr/>
+            <p:nvPr/>
+          </p:nvGrpSpPr>
+          <p:grpSpPr>
+            <a:xfrm>
+              <a:off x="7871739" y="2277248"/>
+              <a:ext cx="2897861" cy="2526174"/>
+              <a:chOff x="7871739" y="2277248"/>
+              <a:chExt cx="2897861" cy="2526174"/>
+            </a:xfrm>
+          </p:grpSpPr>
+          <p:sp>
+            <p:nvSpPr>
+              <p:cNvPr id="6" name="正方形/長方形 5">
+                <a:extLst>
+                  <a:ext uri="{FF2B5EF4-FFF2-40B4-BE49-F238E27FC236}">
+                    <a16:creationId xmlns:a16="http://schemas.microsoft.com/office/drawing/2014/main" id="{E1349001-7A62-4643-8FF5-15038AD67375}"/>
+                  </a:ext>
+                </a:extLst>
+              </p:cNvPr>
+              <p:cNvSpPr/>
+              <p:nvPr/>
+            </p:nvSpPr>
+            <p:spPr>
+              <a:xfrm>
+                <a:off x="8365067" y="3429000"/>
+                <a:ext cx="2404533" cy="677333"/>
+              </a:xfrm>
+              <a:prstGeom prst="rect">
+                <a:avLst/>
+              </a:prstGeom>
+            </p:spPr>
+            <p:style>
+              <a:lnRef idx="1">
+                <a:schemeClr val="accent1"/>
+              </a:lnRef>
+              <a:fillRef idx="2">
+                <a:schemeClr val="accent1"/>
+              </a:fillRef>
+              <a:effectRef idx="1">
+                <a:schemeClr val="accent1"/>
+              </a:effectRef>
+              <a:fontRef idx="minor">
+                <a:schemeClr val="dk1"/>
+              </a:fontRef>
+            </p:style>
+            <p:txBody>
+              <a:bodyPr rtlCol="0" anchor="ctr"/>
+              <a:lstStyle/>
+              <a:p>
+                <a:pPr algn="ctr"/>
+                <a:r>
+                  <a:rPr lang="en-US" altLang="ja-JP" sz="1600" dirty="0"/>
+                  <a:t>Base-C(Node server)</a:t>
+                </a:r>
+                <a:endParaRPr lang="ja-JP" altLang="en-US" sz="1600" dirty="0"/>
+              </a:p>
+            </p:txBody>
+          </p:sp>
+          <p:sp>
+            <p:nvSpPr>
+              <p:cNvPr id="10" name="正方形/長方形 9">
+                <a:extLst>
+                  <a:ext uri="{FF2B5EF4-FFF2-40B4-BE49-F238E27FC236}">
+                    <a16:creationId xmlns:a16="http://schemas.microsoft.com/office/drawing/2014/main" id="{949AE05A-6F1B-455C-95D4-AE9A27F28825}"/>
+                  </a:ext>
+                </a:extLst>
+              </p:cNvPr>
+              <p:cNvSpPr/>
+              <p:nvPr/>
+            </p:nvSpPr>
+            <p:spPr>
+              <a:xfrm>
+                <a:off x="8365067" y="4126089"/>
+                <a:ext cx="2404533" cy="677333"/>
+              </a:xfrm>
+              <a:prstGeom prst="rect">
+                <a:avLst/>
+              </a:prstGeom>
+            </p:spPr>
+            <p:style>
+              <a:lnRef idx="1">
+                <a:schemeClr val="accent4"/>
+              </a:lnRef>
+              <a:fillRef idx="2">
+                <a:schemeClr val="accent4"/>
+              </a:fillRef>
+              <a:effectRef idx="1">
+                <a:schemeClr val="accent4"/>
+              </a:effectRef>
+              <a:fontRef idx="minor">
+                <a:schemeClr val="dk1"/>
+              </a:fontRef>
+            </p:style>
+            <p:txBody>
+              <a:bodyPr rtlCol="0" anchor="ctr"/>
+              <a:lstStyle/>
+              <a:p>
+                <a:pPr algn="ctr"/>
+                <a:r>
+                  <a:rPr kumimoji="1" lang="en-US" altLang="ja-JP" dirty="0"/>
+                  <a:t>VM</a:t>
+                </a:r>
+                <a:endParaRPr kumimoji="1" lang="ja-JP" altLang="en-US" dirty="0"/>
+              </a:p>
+            </p:txBody>
+          </p:sp>
+          <p:sp>
+            <p:nvSpPr>
+              <p:cNvPr id="16" name="正方形/長方形 15">
+                <a:extLst>
+                  <a:ext uri="{FF2B5EF4-FFF2-40B4-BE49-F238E27FC236}">
+                    <a16:creationId xmlns:a16="http://schemas.microsoft.com/office/drawing/2014/main" id="{31BDD910-E7A1-4091-ABBF-FAA7A3D56B22}"/>
+                  </a:ext>
+                </a:extLst>
+              </p:cNvPr>
+              <p:cNvSpPr/>
+              <p:nvPr/>
+            </p:nvSpPr>
+            <p:spPr>
+              <a:xfrm>
+                <a:off x="7871739" y="2277249"/>
+                <a:ext cx="1151467" cy="677335"/>
+              </a:xfrm>
+              <a:prstGeom prst="rect">
+                <a:avLst/>
+              </a:prstGeom>
+            </p:spPr>
+            <p:style>
+              <a:lnRef idx="1">
+                <a:schemeClr val="accent6"/>
+              </a:lnRef>
+              <a:fillRef idx="2">
+                <a:schemeClr val="accent6"/>
+              </a:fillRef>
+              <a:effectRef idx="1">
+                <a:schemeClr val="accent6"/>
+              </a:effectRef>
+              <a:fontRef idx="minor">
+                <a:schemeClr val="dk1"/>
+              </a:fontRef>
+            </p:style>
+            <p:txBody>
+              <a:bodyPr rtlCol="0" anchor="ctr"/>
+              <a:lstStyle/>
+              <a:p>
+                <a:pPr algn="ctr"/>
+                <a:r>
+                  <a:rPr lang="en-US" altLang="ja-JP" sz="1400" dirty="0"/>
+                  <a:t>single u</a:t>
+                </a:r>
+                <a:r>
+                  <a:rPr kumimoji="1" lang="en-US" altLang="ja-JP" sz="1400" dirty="0"/>
+                  <a:t>ser Container</a:t>
+                </a:r>
+                <a:endParaRPr kumimoji="1" lang="ja-JP" altLang="en-US" sz="1400" dirty="0"/>
+              </a:p>
+            </p:txBody>
+          </p:sp>
+          <p:sp>
+            <p:nvSpPr>
+              <p:cNvPr id="17" name="正方形/長方形 16">
+                <a:extLst>
+                  <a:ext uri="{FF2B5EF4-FFF2-40B4-BE49-F238E27FC236}">
+                    <a16:creationId xmlns:a16="http://schemas.microsoft.com/office/drawing/2014/main" id="{8A28D9D9-27E6-44EA-BD15-79A5CC7DCA82}"/>
+                  </a:ext>
+                </a:extLst>
+              </p:cNvPr>
+              <p:cNvSpPr/>
+              <p:nvPr/>
+            </p:nvSpPr>
+            <p:spPr>
+              <a:xfrm>
+                <a:off x="9618132" y="2277248"/>
+                <a:ext cx="1151467" cy="677335"/>
+              </a:xfrm>
+              <a:prstGeom prst="rect">
+                <a:avLst/>
+              </a:prstGeom>
+            </p:spPr>
+            <p:style>
+              <a:lnRef idx="1">
+                <a:schemeClr val="accent6"/>
+              </a:lnRef>
+              <a:fillRef idx="2">
+                <a:schemeClr val="accent6"/>
+              </a:fillRef>
+              <a:effectRef idx="1">
+                <a:schemeClr val="accent6"/>
+              </a:effectRef>
+              <a:fontRef idx="minor">
+                <a:schemeClr val="dk1"/>
+              </a:fontRef>
+            </p:style>
+            <p:txBody>
+              <a:bodyPr rtlCol="0" anchor="ctr"/>
+              <a:lstStyle/>
+              <a:p>
+                <a:pPr algn="ctr"/>
+                <a:r>
+                  <a:rPr lang="en-US" altLang="ja-JP" sz="1400" dirty="0"/>
+                  <a:t>single u</a:t>
+                </a:r>
+                <a:r>
+                  <a:rPr kumimoji="1" lang="en-US" altLang="ja-JP" sz="1400" dirty="0"/>
+                  <a:t>ser Container</a:t>
+                </a:r>
+                <a:endParaRPr kumimoji="1" lang="ja-JP" altLang="en-US" sz="1400" dirty="0"/>
+              </a:p>
+            </p:txBody>
+          </p:sp>
+        </p:grpSp>
+        <p:cxnSp>
+          <p:nvCxnSpPr>
+            <p:cNvPr id="19" name="直線コネクタ 18">
+              <a:extLst>
+                <a:ext uri="{FF2B5EF4-FFF2-40B4-BE49-F238E27FC236}">
+                  <a16:creationId xmlns:a16="http://schemas.microsoft.com/office/drawing/2014/main" id="{CE994559-B933-44EF-B79B-B54B329D8E12}"/>
+                </a:ext>
+              </a:extLst>
+            </p:cNvPr>
+            <p:cNvCxnSpPr>
+              <a:cxnSpLocks/>
+              <a:stCxn id="11" idx="2"/>
+              <a:endCxn id="8" idx="3"/>
+            </p:cNvCxnSpPr>
+            <p:nvPr/>
+          </p:nvCxnSpPr>
+          <p:spPr>
+            <a:xfrm flipH="1">
+              <a:off x="3290709" y="4464752"/>
+              <a:ext cx="296333" cy="0"/>
+            </a:xfrm>
+            <a:prstGeom prst="line">
+              <a:avLst/>
+            </a:prstGeom>
+          </p:spPr>
+          <p:style>
+            <a:lnRef idx="3">
+              <a:schemeClr val="accent2"/>
+            </a:lnRef>
+            <a:fillRef idx="0">
+              <a:schemeClr val="accent2"/>
+            </a:fillRef>
+            <a:effectRef idx="2">
+              <a:schemeClr val="accent2"/>
+            </a:effectRef>
+            <a:fontRef idx="minor">
+              <a:schemeClr val="tx1"/>
+            </a:fontRef>
+          </p:style>
+        </p:cxnSp>
+        <p:cxnSp>
+          <p:nvCxnSpPr>
+            <p:cNvPr id="21" name="直線コネクタ 20">
+              <a:extLst>
+                <a:ext uri="{FF2B5EF4-FFF2-40B4-BE49-F238E27FC236}">
+                  <a16:creationId xmlns:a16="http://schemas.microsoft.com/office/drawing/2014/main" id="{465B7F88-B9E9-4063-9FC0-056C97C16557}"/>
+                </a:ext>
+              </a:extLst>
+            </p:cNvPr>
+            <p:cNvCxnSpPr>
+              <a:cxnSpLocks/>
+            </p:cNvCxnSpPr>
+            <p:nvPr/>
+          </p:nvCxnSpPr>
+          <p:spPr>
+            <a:xfrm>
+              <a:off x="643465" y="5429956"/>
+              <a:ext cx="11211022" cy="0"/>
+            </a:xfrm>
+            <a:prstGeom prst="line">
+              <a:avLst/>
+            </a:prstGeom>
+          </p:spPr>
+          <p:style>
+            <a:lnRef idx="3">
+              <a:schemeClr val="accent1"/>
+            </a:lnRef>
+            <a:fillRef idx="0">
+              <a:schemeClr val="accent1"/>
+            </a:fillRef>
+            <a:effectRef idx="2">
+              <a:schemeClr val="accent1"/>
+            </a:effectRef>
+            <a:fontRef idx="minor">
+              <a:schemeClr val="tx1"/>
+            </a:fontRef>
+          </p:style>
+        </p:cxnSp>
+        <p:cxnSp>
+          <p:nvCxnSpPr>
+            <p:cNvPr id="23" name="直線コネクタ 22">
+              <a:extLst>
+                <a:ext uri="{FF2B5EF4-FFF2-40B4-BE49-F238E27FC236}">
+                  <a16:creationId xmlns:a16="http://schemas.microsoft.com/office/drawing/2014/main" id="{086E845D-3424-48FE-84A2-E95B72046B39}"/>
+                </a:ext>
+              </a:extLst>
+            </p:cNvPr>
+            <p:cNvCxnSpPr>
+              <a:stCxn id="8" idx="2"/>
+            </p:cNvCxnSpPr>
+            <p:nvPr/>
+          </p:nvCxnSpPr>
+          <p:spPr>
+            <a:xfrm flipH="1">
+              <a:off x="2088442" y="4803418"/>
+              <a:ext cx="1" cy="626534"/>
+            </a:xfrm>
+            <a:prstGeom prst="line">
+              <a:avLst/>
+            </a:prstGeom>
+          </p:spPr>
+          <p:style>
+            <a:lnRef idx="3">
+              <a:schemeClr val="accent1"/>
+            </a:lnRef>
+            <a:fillRef idx="0">
+              <a:schemeClr val="accent1"/>
+            </a:fillRef>
+            <a:effectRef idx="2">
+              <a:schemeClr val="accent1"/>
+            </a:effectRef>
+            <a:fontRef idx="minor">
+              <a:schemeClr val="tx1"/>
+            </a:fontRef>
+          </p:style>
+        </p:cxnSp>
+        <p:cxnSp>
+          <p:nvCxnSpPr>
+            <p:cNvPr id="24" name="直線コネクタ 23">
+              <a:extLst>
+                <a:ext uri="{FF2B5EF4-FFF2-40B4-BE49-F238E27FC236}">
+                  <a16:creationId xmlns:a16="http://schemas.microsoft.com/office/drawing/2014/main" id="{1C0A7E30-6C7E-42E3-94CA-7B7F0621D702}"/>
+                </a:ext>
+              </a:extLst>
+            </p:cNvPr>
+            <p:cNvCxnSpPr>
+              <a:cxnSpLocks/>
+              <a:stCxn id="9" idx="2"/>
+            </p:cNvCxnSpPr>
+            <p:nvPr/>
+          </p:nvCxnSpPr>
+          <p:spPr>
+            <a:xfrm>
+              <a:off x="6541911" y="4803422"/>
+              <a:ext cx="0" cy="626534"/>
+            </a:xfrm>
+            <a:prstGeom prst="line">
+              <a:avLst/>
+            </a:prstGeom>
+          </p:spPr>
+          <p:style>
+            <a:lnRef idx="3">
+              <a:schemeClr val="accent1"/>
+            </a:lnRef>
+            <a:fillRef idx="0">
+              <a:schemeClr val="accent1"/>
+            </a:fillRef>
+            <a:effectRef idx="2">
+              <a:schemeClr val="accent1"/>
+            </a:effectRef>
+            <a:fontRef idx="minor">
+              <a:schemeClr val="tx1"/>
+            </a:fontRef>
+          </p:style>
+        </p:cxnSp>
+        <p:cxnSp>
+          <p:nvCxnSpPr>
+            <p:cNvPr id="25" name="直線コネクタ 24">
+              <a:extLst>
+                <a:ext uri="{FF2B5EF4-FFF2-40B4-BE49-F238E27FC236}">
+                  <a16:creationId xmlns:a16="http://schemas.microsoft.com/office/drawing/2014/main" id="{4979E9CE-CA04-4550-AE72-09189B8921B2}"/>
+                </a:ext>
+              </a:extLst>
+            </p:cNvPr>
+            <p:cNvCxnSpPr>
+              <a:cxnSpLocks/>
+              <a:stCxn id="10" idx="2"/>
+            </p:cNvCxnSpPr>
+            <p:nvPr/>
+          </p:nvCxnSpPr>
+          <p:spPr>
+            <a:xfrm flipH="1">
+              <a:off x="9567333" y="4803422"/>
+              <a:ext cx="1" cy="626534"/>
+            </a:xfrm>
+            <a:prstGeom prst="line">
+              <a:avLst/>
+            </a:prstGeom>
+          </p:spPr>
+          <p:style>
+            <a:lnRef idx="3">
+              <a:schemeClr val="accent1"/>
+            </a:lnRef>
+            <a:fillRef idx="0">
+              <a:schemeClr val="accent1"/>
+            </a:fillRef>
+            <a:effectRef idx="2">
+              <a:schemeClr val="accent1"/>
+            </a:effectRef>
+            <a:fontRef idx="minor">
+              <a:schemeClr val="tx1"/>
+            </a:fontRef>
+          </p:style>
+        </p:cxnSp>
+        <p:cxnSp>
+          <p:nvCxnSpPr>
+            <p:cNvPr id="31" name="直線コネクタ 30">
+              <a:extLst>
+                <a:ext uri="{FF2B5EF4-FFF2-40B4-BE49-F238E27FC236}">
+                  <a16:creationId xmlns:a16="http://schemas.microsoft.com/office/drawing/2014/main" id="{74D887E3-8641-4D66-A76B-FF37E7E4C637}"/>
+                </a:ext>
+              </a:extLst>
+            </p:cNvPr>
+            <p:cNvCxnSpPr>
+              <a:cxnSpLocks/>
+            </p:cNvCxnSpPr>
+            <p:nvPr/>
+          </p:nvCxnSpPr>
+          <p:spPr>
+            <a:xfrm>
+              <a:off x="508000" y="1717420"/>
+              <a:ext cx="11346487" cy="0"/>
+            </a:xfrm>
+            <a:prstGeom prst="line">
+              <a:avLst/>
+            </a:prstGeom>
+          </p:spPr>
+          <p:style>
+            <a:lnRef idx="3">
+              <a:schemeClr val="accent6"/>
+            </a:lnRef>
+            <a:fillRef idx="0">
+              <a:schemeClr val="accent6"/>
+            </a:fillRef>
+            <a:effectRef idx="2">
+              <a:schemeClr val="accent6"/>
+            </a:effectRef>
+            <a:fontRef idx="minor">
+              <a:schemeClr val="tx1"/>
+            </a:fontRef>
+          </p:style>
+        </p:cxnSp>
+        <p:cxnSp>
+          <p:nvCxnSpPr>
+            <p:cNvPr id="37" name="直線コネクタ 36">
+              <a:extLst>
+                <a:ext uri="{FF2B5EF4-FFF2-40B4-BE49-F238E27FC236}">
+                  <a16:creationId xmlns:a16="http://schemas.microsoft.com/office/drawing/2014/main" id="{D750D9C1-0E7F-472B-8906-CB2C9EB51133}"/>
+                </a:ext>
+              </a:extLst>
+            </p:cNvPr>
+            <p:cNvCxnSpPr>
+              <a:cxnSpLocks/>
+              <a:stCxn id="12" idx="0"/>
+            </p:cNvCxnSpPr>
+            <p:nvPr/>
+          </p:nvCxnSpPr>
+          <p:spPr>
+            <a:xfrm flipV="1">
+              <a:off x="1461909" y="1717420"/>
+              <a:ext cx="0" cy="559828"/>
+            </a:xfrm>
+            <a:prstGeom prst="line">
+              <a:avLst/>
+            </a:prstGeom>
+          </p:spPr>
+          <p:style>
+            <a:lnRef idx="3">
+              <a:schemeClr val="accent6"/>
+            </a:lnRef>
+            <a:fillRef idx="0">
+              <a:schemeClr val="accent6"/>
+            </a:fillRef>
+            <a:effectRef idx="2">
+              <a:schemeClr val="accent6"/>
+            </a:effectRef>
+            <a:fontRef idx="minor">
+              <a:schemeClr val="tx1"/>
+            </a:fontRef>
+          </p:style>
+        </p:cxnSp>
+        <p:cxnSp>
+          <p:nvCxnSpPr>
+            <p:cNvPr id="39" name="直線コネクタ 38">
+              <a:extLst>
+                <a:ext uri="{FF2B5EF4-FFF2-40B4-BE49-F238E27FC236}">
+                  <a16:creationId xmlns:a16="http://schemas.microsoft.com/office/drawing/2014/main" id="{D0C08CC2-54F1-4913-B6A9-E26DC47B965F}"/>
+                </a:ext>
+              </a:extLst>
+            </p:cNvPr>
+            <p:cNvCxnSpPr>
+              <a:cxnSpLocks/>
+              <a:stCxn id="13" idx="0"/>
+            </p:cNvCxnSpPr>
+            <p:nvPr/>
+          </p:nvCxnSpPr>
+          <p:spPr>
+            <a:xfrm flipH="1" flipV="1">
+              <a:off x="3208299" y="1715286"/>
+              <a:ext cx="1" cy="561962"/>
+            </a:xfrm>
+            <a:prstGeom prst="line">
+              <a:avLst/>
+            </a:prstGeom>
+          </p:spPr>
+          <p:style>
+            <a:lnRef idx="3">
+              <a:schemeClr val="accent6"/>
+            </a:lnRef>
+            <a:fillRef idx="0">
+              <a:schemeClr val="accent6"/>
+            </a:fillRef>
+            <a:effectRef idx="2">
+              <a:schemeClr val="accent6"/>
+            </a:effectRef>
+            <a:fontRef idx="minor">
+              <a:schemeClr val="tx1"/>
+            </a:fontRef>
+          </p:style>
+        </p:cxnSp>
+        <p:cxnSp>
+          <p:nvCxnSpPr>
+            <p:cNvPr id="40" name="直線コネクタ 39">
+              <a:extLst>
+                <a:ext uri="{FF2B5EF4-FFF2-40B4-BE49-F238E27FC236}">
+                  <a16:creationId xmlns:a16="http://schemas.microsoft.com/office/drawing/2014/main" id="{10B23F35-246C-497E-9F75-4745BDD66565}"/>
+                </a:ext>
+              </a:extLst>
+            </p:cNvPr>
+            <p:cNvCxnSpPr>
+              <a:cxnSpLocks/>
+              <a:stCxn id="15" idx="0"/>
+            </p:cNvCxnSpPr>
+            <p:nvPr/>
+          </p:nvCxnSpPr>
+          <p:spPr>
+            <a:xfrm flipH="1" flipV="1">
+              <a:off x="4954689" y="1715286"/>
+              <a:ext cx="2" cy="559832"/>
+            </a:xfrm>
+            <a:prstGeom prst="line">
+              <a:avLst/>
+            </a:prstGeom>
+          </p:spPr>
+          <p:style>
+            <a:lnRef idx="3">
+              <a:schemeClr val="accent6"/>
+            </a:lnRef>
+            <a:fillRef idx="0">
+              <a:schemeClr val="accent6"/>
+            </a:fillRef>
+            <a:effectRef idx="2">
+              <a:schemeClr val="accent6"/>
+            </a:effectRef>
+            <a:fontRef idx="minor">
+              <a:schemeClr val="tx1"/>
+            </a:fontRef>
+          </p:style>
+        </p:cxnSp>
+        <p:cxnSp>
+          <p:nvCxnSpPr>
+            <p:cNvPr id="41" name="直線コネクタ 40">
+              <a:extLst>
+                <a:ext uri="{FF2B5EF4-FFF2-40B4-BE49-F238E27FC236}">
+                  <a16:creationId xmlns:a16="http://schemas.microsoft.com/office/drawing/2014/main" id="{F185B2B7-BAC9-406E-9E41-B75F8A0FC2B7}"/>
+                </a:ext>
+              </a:extLst>
+            </p:cNvPr>
+            <p:cNvCxnSpPr>
+              <a:cxnSpLocks/>
+              <a:stCxn id="14" idx="0"/>
+            </p:cNvCxnSpPr>
+            <p:nvPr/>
+          </p:nvCxnSpPr>
+          <p:spPr>
+            <a:xfrm flipH="1" flipV="1">
+              <a:off x="6701080" y="1715286"/>
+              <a:ext cx="2" cy="559832"/>
+            </a:xfrm>
+            <a:prstGeom prst="line">
+              <a:avLst/>
+            </a:prstGeom>
+          </p:spPr>
+          <p:style>
+            <a:lnRef idx="3">
+              <a:schemeClr val="accent6"/>
+            </a:lnRef>
+            <a:fillRef idx="0">
+              <a:schemeClr val="accent6"/>
+            </a:fillRef>
+            <a:effectRef idx="2">
+              <a:schemeClr val="accent6"/>
+            </a:effectRef>
+            <a:fontRef idx="minor">
+              <a:schemeClr val="tx1"/>
+            </a:fontRef>
+          </p:style>
+        </p:cxnSp>
+        <p:cxnSp>
+          <p:nvCxnSpPr>
+            <p:cNvPr id="42" name="直線コネクタ 41">
+              <a:extLst>
+                <a:ext uri="{FF2B5EF4-FFF2-40B4-BE49-F238E27FC236}">
+                  <a16:creationId xmlns:a16="http://schemas.microsoft.com/office/drawing/2014/main" id="{3ADC3749-936F-4CAB-96E5-5C5AE3A3344B}"/>
+                </a:ext>
+              </a:extLst>
+            </p:cNvPr>
+            <p:cNvCxnSpPr>
+              <a:cxnSpLocks/>
+              <a:stCxn id="16" idx="0"/>
+            </p:cNvCxnSpPr>
+            <p:nvPr/>
+          </p:nvCxnSpPr>
+          <p:spPr>
+            <a:xfrm flipH="1" flipV="1">
+              <a:off x="8447471" y="1730129"/>
+              <a:ext cx="2" cy="547120"/>
+            </a:xfrm>
+            <a:prstGeom prst="line">
+              <a:avLst/>
+            </a:prstGeom>
+          </p:spPr>
+          <p:style>
+            <a:lnRef idx="3">
+              <a:schemeClr val="accent6"/>
+            </a:lnRef>
+            <a:fillRef idx="0">
+              <a:schemeClr val="accent6"/>
+            </a:fillRef>
+            <a:effectRef idx="2">
+              <a:schemeClr val="accent6"/>
+            </a:effectRef>
+            <a:fontRef idx="minor">
+              <a:schemeClr val="tx1"/>
+            </a:fontRef>
+          </p:style>
+        </p:cxnSp>
+        <p:cxnSp>
+          <p:nvCxnSpPr>
+            <p:cNvPr id="43" name="直線コネクタ 42">
+              <a:extLst>
+                <a:ext uri="{FF2B5EF4-FFF2-40B4-BE49-F238E27FC236}">
+                  <a16:creationId xmlns:a16="http://schemas.microsoft.com/office/drawing/2014/main" id="{1F6E22F4-CF89-4155-A726-C0C7C17902BF}"/>
+                </a:ext>
+              </a:extLst>
+            </p:cNvPr>
+            <p:cNvCxnSpPr>
+              <a:cxnSpLocks/>
+              <a:stCxn id="17" idx="0"/>
+            </p:cNvCxnSpPr>
+            <p:nvPr/>
+          </p:nvCxnSpPr>
+          <p:spPr>
+            <a:xfrm flipV="1">
+              <a:off x="10193866" y="1717418"/>
+              <a:ext cx="7758" cy="559830"/>
+            </a:xfrm>
+            <a:prstGeom prst="line">
+              <a:avLst/>
+            </a:prstGeom>
+          </p:spPr>
+          <p:style>
+            <a:lnRef idx="3">
+              <a:schemeClr val="accent6"/>
+            </a:lnRef>
+            <a:fillRef idx="0">
+              <a:schemeClr val="accent6"/>
+            </a:fillRef>
+            <a:effectRef idx="2">
+              <a:schemeClr val="accent6"/>
+            </a:effectRef>
+            <a:fontRef idx="minor">
+              <a:schemeClr val="tx1"/>
+            </a:fontRef>
+          </p:style>
+        </p:cxnSp>
+        <p:sp>
+          <p:nvSpPr>
+            <p:cNvPr id="57" name="テキスト ボックス 56">
+              <a:extLst>
+                <a:ext uri="{FF2B5EF4-FFF2-40B4-BE49-F238E27FC236}">
+                  <a16:creationId xmlns:a16="http://schemas.microsoft.com/office/drawing/2014/main" id="{55769C5D-8421-4971-8ADB-E82C7B6D612C}"/>
+                </a:ext>
+              </a:extLst>
+            </p:cNvPr>
+            <p:cNvSpPr txBox="1"/>
+            <p:nvPr/>
+          </p:nvSpPr>
+          <p:spPr>
+            <a:xfrm>
+              <a:off x="9684711" y="5122177"/>
+              <a:ext cx="2169776" cy="307777"/>
+            </a:xfrm>
+            <a:prstGeom prst="rect">
+              <a:avLst/>
+            </a:prstGeom>
+            <a:noFill/>
+          </p:spPr>
+          <p:txBody>
+            <a:bodyPr wrap="square" rtlCol="0">
+              <a:spAutoFit/>
+            </a:bodyPr>
+            <a:lstStyle/>
+            <a:p>
+              <a:r>
+                <a:rPr lang="en-US" altLang="ja-JP" sz="1400" dirty="0">
+                  <a:solidFill>
+                    <a:schemeClr val="accent1"/>
+                  </a:solidFill>
+                </a:rPr>
+                <a:t>Base Container network</a:t>
+              </a:r>
+              <a:endParaRPr kumimoji="1" lang="ja-JP" altLang="en-US" sz="1400" dirty="0">
+                <a:solidFill>
+                  <a:schemeClr val="accent1"/>
+                </a:solidFill>
+              </a:endParaRPr>
+            </a:p>
+          </p:txBody>
+        </p:sp>
+        <p:sp>
+          <p:nvSpPr>
+            <p:cNvPr id="2" name="四角形: 角を丸くする 1">
+              <a:extLst>
+                <a:ext uri="{FF2B5EF4-FFF2-40B4-BE49-F238E27FC236}">
+                  <a16:creationId xmlns:a16="http://schemas.microsoft.com/office/drawing/2014/main" id="{61870EAD-1389-4E7B-AA77-17D4BD1995D0}"/>
+                </a:ext>
+              </a:extLst>
+            </p:cNvPr>
+            <p:cNvSpPr/>
+            <p:nvPr/>
+          </p:nvSpPr>
+          <p:spPr>
+            <a:xfrm>
+              <a:off x="886175" y="2974343"/>
+              <a:ext cx="9883425" cy="441949"/>
+            </a:xfrm>
+            <a:prstGeom prst="roundRect">
+              <a:avLst/>
+            </a:prstGeom>
+          </p:spPr>
+          <p:style>
+            <a:lnRef idx="1">
+              <a:schemeClr val="accent3"/>
+            </a:lnRef>
+            <a:fillRef idx="2">
+              <a:schemeClr val="accent3"/>
+            </a:fillRef>
+            <a:effectRef idx="1">
+              <a:schemeClr val="accent3"/>
+            </a:effectRef>
+            <a:fontRef idx="minor">
+              <a:schemeClr val="dk1"/>
+            </a:fontRef>
+          </p:style>
+          <p:txBody>
+            <a:bodyPr rtlCol="0" anchor="ctr"/>
+            <a:lstStyle/>
+            <a:p>
+              <a:pPr algn="ctr"/>
+              <a:r>
+                <a:rPr kumimoji="1" lang="en-US" altLang="ja-JP" dirty="0"/>
+                <a:t>Docker Swarm</a:t>
+              </a:r>
+              <a:endParaRPr kumimoji="1" lang="ja-JP" altLang="en-US" dirty="0"/>
+            </a:p>
+          </p:txBody>
+        </p:sp>
+      </p:grpSp>
+    </p:spTree>
+    <p:extLst>
+      <p:ext uri="{BB962C8B-B14F-4D97-AF65-F5344CB8AC3E}">
+        <p14:creationId xmlns:p14="http://schemas.microsoft.com/office/powerpoint/2010/main" val="2711451936"/>
+      </p:ext>
+    </p:extLst>
+  </p:cSld>
+  <p:clrMapOvr>
+    <a:masterClrMapping/>
+  </p:clrMapOvr>
+</p:sld>
+</file>
+
+<file path=ppt/slides/slide3.xml><?xml version="1.0" encoding="utf-8"?>
 <p:sld xmlns:a="http://schemas.openxmlformats.org/drawingml/2006/main" xmlns:r="http://schemas.openxmlformats.org/officeDocument/2006/relationships" xmlns:p="http://schemas.openxmlformats.org/presentationml/2006/main">
   <p:cSld>
     <p:spTree>
@@ -4950,7 +8067,7 @@
     </p:spTree>
     <p:extLst>
       <p:ext uri="{BB962C8B-B14F-4D97-AF65-F5344CB8AC3E}">
-        <p14:creationId xmlns:p14="http://schemas.microsoft.com/office/powerpoint/2010/main" val="2711451936"/>
+        <p14:creationId xmlns:p14="http://schemas.microsoft.com/office/powerpoint/2010/main" val="2220700152"/>
       </p:ext>
     </p:extLst>
   </p:cSld>
@@ -4960,7 +8077,7 @@
 </p:sld>
 </file>
 
-<file path=ppt/slides/slide2.xml><?xml version="1.0" encoding="utf-8"?>
+<file path=ppt/slides/slide4.xml><?xml version="1.0" encoding="utf-8"?>
 <p:sld xmlns:a="http://schemas.openxmlformats.org/drawingml/2006/main" xmlns:r="http://schemas.openxmlformats.org/officeDocument/2006/relationships" xmlns:p="http://schemas.openxmlformats.org/presentationml/2006/main">
   <p:cSld>
     <p:spTree>
@@ -6355,7 +9472,7 @@
 </p:sld>
 </file>
 
-<file path=ppt/slides/slide3.xml><?xml version="1.0" encoding="utf-8"?>
+<file path=ppt/slides/slide5.xml><?xml version="1.0" encoding="utf-8"?>
 <p:sld xmlns:a="http://schemas.openxmlformats.org/drawingml/2006/main" xmlns:r="http://schemas.openxmlformats.org/officeDocument/2006/relationships" xmlns:p="http://schemas.openxmlformats.org/presentationml/2006/main">
   <p:cSld>
     <p:spTree>
@@ -7738,7 +10855,7 @@
 </p:sld>
 </file>
 
-<file path=ppt/slides/slide4.xml><?xml version="1.0" encoding="utf-8"?>
+<file path=ppt/slides/slide6.xml><?xml version="1.0" encoding="utf-8"?>
 <p:sld xmlns:a="http://schemas.openxmlformats.org/drawingml/2006/main" xmlns:r="http://schemas.openxmlformats.org/officeDocument/2006/relationships" xmlns:p="http://schemas.openxmlformats.org/presentationml/2006/main">
   <p:cSld>
     <p:spTree>
@@ -9119,7 +12236,7 @@
 </p:sld>
 </file>
 
-<file path=ppt/slides/slide5.xml><?xml version="1.0" encoding="utf-8"?>
+<file path=ppt/slides/slide7.xml><?xml version="1.0" encoding="utf-8"?>
 <p:sld xmlns:a="http://schemas.openxmlformats.org/drawingml/2006/main" xmlns:r="http://schemas.openxmlformats.org/officeDocument/2006/relationships" xmlns:p="http://schemas.openxmlformats.org/presentationml/2006/main">
   <p:cSld>
     <p:spTree>

</xml_diff>